<commit_message>
sunum ve sunum görselleri
</commit_message>
<xml_diff>
--- a/İklim Değişikliği ve İstanbul.pptx
+++ b/İklim Değişikliği ve İstanbul.pptx
@@ -7,25 +7,33 @@
   <p:sldIdLst>
     <p:sldId id="256" r:id="rId2"/>
     <p:sldId id="257" r:id="rId3"/>
-    <p:sldId id="258" r:id="rId4"/>
-    <p:sldId id="259" r:id="rId5"/>
-    <p:sldId id="260" r:id="rId6"/>
-    <p:sldId id="262" r:id="rId7"/>
-    <p:sldId id="263" r:id="rId8"/>
-    <p:sldId id="264" r:id="rId9"/>
-    <p:sldId id="265" r:id="rId10"/>
-    <p:sldId id="266" r:id="rId11"/>
-    <p:sldId id="267" r:id="rId12"/>
-    <p:sldId id="268" r:id="rId13"/>
-    <p:sldId id="269" r:id="rId14"/>
-    <p:sldId id="270" r:id="rId15"/>
-    <p:sldId id="271" r:id="rId16"/>
-    <p:sldId id="272" r:id="rId17"/>
-    <p:sldId id="273" r:id="rId18"/>
-    <p:sldId id="274" r:id="rId19"/>
-    <p:sldId id="275" r:id="rId20"/>
-    <p:sldId id="277" r:id="rId21"/>
-    <p:sldId id="276" r:id="rId22"/>
+    <p:sldId id="278" r:id="rId4"/>
+    <p:sldId id="285" r:id="rId5"/>
+    <p:sldId id="258" r:id="rId6"/>
+    <p:sldId id="259" r:id="rId7"/>
+    <p:sldId id="260" r:id="rId8"/>
+    <p:sldId id="262" r:id="rId9"/>
+    <p:sldId id="263" r:id="rId10"/>
+    <p:sldId id="264" r:id="rId11"/>
+    <p:sldId id="265" r:id="rId12"/>
+    <p:sldId id="266" r:id="rId13"/>
+    <p:sldId id="267" r:id="rId14"/>
+    <p:sldId id="268" r:id="rId15"/>
+    <p:sldId id="269" r:id="rId16"/>
+    <p:sldId id="270" r:id="rId17"/>
+    <p:sldId id="271" r:id="rId18"/>
+    <p:sldId id="272" r:id="rId19"/>
+    <p:sldId id="273" r:id="rId20"/>
+    <p:sldId id="274" r:id="rId21"/>
+    <p:sldId id="275" r:id="rId22"/>
+    <p:sldId id="277" r:id="rId23"/>
+    <p:sldId id="276" r:id="rId24"/>
+    <p:sldId id="279" r:id="rId25"/>
+    <p:sldId id="282" r:id="rId26"/>
+    <p:sldId id="280" r:id="rId27"/>
+    <p:sldId id="281" r:id="rId28"/>
+    <p:sldId id="283" r:id="rId29"/>
+    <p:sldId id="284" r:id="rId30"/>
   </p:sldIdLst>
   <p:sldSz cx="12192000" cy="6858000"/>
   <p:notesSz cx="6858000" cy="9144000"/>
@@ -854,7 +862,7 @@
           <a:p>
             <a:fld id="{5CAD5305-01D2-4D2E-A617-8E49C3CC77B8}" type="datetimeFigureOut">
               <a:rPr lang="tr-TR" smtClean="0"/>
-              <a:t>1.09.2023</a:t>
+              <a:t>2.09.2023</a:t>
             </a:fld>
             <a:endParaRPr lang="tr-TR"/>
           </a:p>
@@ -1105,7 +1113,7 @@
           <a:p>
             <a:fld id="{5CAD5305-01D2-4D2E-A617-8E49C3CC77B8}" type="datetimeFigureOut">
               <a:rPr lang="tr-TR" smtClean="0"/>
-              <a:t>1.09.2023</a:t>
+              <a:t>2.09.2023</a:t>
             </a:fld>
             <a:endParaRPr lang="tr-TR"/>
           </a:p>
@@ -1419,7 +1427,7 @@
           <a:p>
             <a:fld id="{5CAD5305-01D2-4D2E-A617-8E49C3CC77B8}" type="datetimeFigureOut">
               <a:rPr lang="tr-TR" smtClean="0"/>
-              <a:t>1.09.2023</a:t>
+              <a:t>2.09.2023</a:t>
             </a:fld>
             <a:endParaRPr lang="tr-TR"/>
           </a:p>
@@ -1760,7 +1768,7 @@
           <a:p>
             <a:fld id="{5CAD5305-01D2-4D2E-A617-8E49C3CC77B8}" type="datetimeFigureOut">
               <a:rPr lang="tr-TR" smtClean="0"/>
-              <a:t>1.09.2023</a:t>
+              <a:t>2.09.2023</a:t>
             </a:fld>
             <a:endParaRPr lang="tr-TR"/>
           </a:p>
@@ -2074,7 +2082,7 @@
           <a:p>
             <a:fld id="{5CAD5305-01D2-4D2E-A617-8E49C3CC77B8}" type="datetimeFigureOut">
               <a:rPr lang="tr-TR" smtClean="0"/>
-              <a:t>1.09.2023</a:t>
+              <a:t>2.09.2023</a:t>
             </a:fld>
             <a:endParaRPr lang="tr-TR"/>
           </a:p>
@@ -2467,7 +2475,7 @@
           <a:p>
             <a:fld id="{5CAD5305-01D2-4D2E-A617-8E49C3CC77B8}" type="datetimeFigureOut">
               <a:rPr lang="tr-TR" smtClean="0"/>
-              <a:t>1.09.2023</a:t>
+              <a:t>2.09.2023</a:t>
             </a:fld>
             <a:endParaRPr lang="tr-TR"/>
           </a:p>
@@ -2637,7 +2645,7 @@
           <a:p>
             <a:fld id="{5CAD5305-01D2-4D2E-A617-8E49C3CC77B8}" type="datetimeFigureOut">
               <a:rPr lang="tr-TR" smtClean="0"/>
-              <a:t>1.09.2023</a:t>
+              <a:t>2.09.2023</a:t>
             </a:fld>
             <a:endParaRPr lang="tr-TR"/>
           </a:p>
@@ -2817,7 +2825,7 @@
           <a:p>
             <a:fld id="{5CAD5305-01D2-4D2E-A617-8E49C3CC77B8}" type="datetimeFigureOut">
               <a:rPr lang="tr-TR" smtClean="0"/>
-              <a:t>1.09.2023</a:t>
+              <a:t>2.09.2023</a:t>
             </a:fld>
             <a:endParaRPr lang="tr-TR"/>
           </a:p>
@@ -2993,7 +3001,7 @@
           <a:p>
             <a:fld id="{5CAD5305-01D2-4D2E-A617-8E49C3CC77B8}" type="datetimeFigureOut">
               <a:rPr lang="tr-TR" smtClean="0"/>
-              <a:t>1.09.2023</a:t>
+              <a:t>2.09.2023</a:t>
             </a:fld>
             <a:endParaRPr lang="tr-TR"/>
           </a:p>
@@ -3240,7 +3248,7 @@
           <a:p>
             <a:fld id="{5CAD5305-01D2-4D2E-A617-8E49C3CC77B8}" type="datetimeFigureOut">
               <a:rPr lang="tr-TR" smtClean="0"/>
-              <a:t>1.09.2023</a:t>
+              <a:t>2.09.2023</a:t>
             </a:fld>
             <a:endParaRPr lang="tr-TR"/>
           </a:p>
@@ -3472,7 +3480,7 @@
           <a:p>
             <a:fld id="{5CAD5305-01D2-4D2E-A617-8E49C3CC77B8}" type="datetimeFigureOut">
               <a:rPr lang="tr-TR" smtClean="0"/>
-              <a:t>1.09.2023</a:t>
+              <a:t>2.09.2023</a:t>
             </a:fld>
             <a:endParaRPr lang="tr-TR"/>
           </a:p>
@@ -3846,7 +3854,7 @@
           <a:p>
             <a:fld id="{5CAD5305-01D2-4D2E-A617-8E49C3CC77B8}" type="datetimeFigureOut">
               <a:rPr lang="tr-TR" smtClean="0"/>
-              <a:t>1.09.2023</a:t>
+              <a:t>2.09.2023</a:t>
             </a:fld>
             <a:endParaRPr lang="tr-TR"/>
           </a:p>
@@ -3969,7 +3977,7 @@
           <a:p>
             <a:fld id="{5CAD5305-01D2-4D2E-A617-8E49C3CC77B8}" type="datetimeFigureOut">
               <a:rPr lang="tr-TR" smtClean="0"/>
-              <a:t>1.09.2023</a:t>
+              <a:t>2.09.2023</a:t>
             </a:fld>
             <a:endParaRPr lang="tr-TR"/>
           </a:p>
@@ -4064,7 +4072,7 @@
           <a:p>
             <a:fld id="{5CAD5305-01D2-4D2E-A617-8E49C3CC77B8}" type="datetimeFigureOut">
               <a:rPr lang="tr-TR" smtClean="0"/>
-              <a:t>1.09.2023</a:t>
+              <a:t>2.09.2023</a:t>
             </a:fld>
             <a:endParaRPr lang="tr-TR"/>
           </a:p>
@@ -4319,7 +4327,7 @@
           <a:p>
             <a:fld id="{5CAD5305-01D2-4D2E-A617-8E49C3CC77B8}" type="datetimeFigureOut">
               <a:rPr lang="tr-TR" smtClean="0"/>
-              <a:t>1.09.2023</a:t>
+              <a:t>2.09.2023</a:t>
             </a:fld>
             <a:endParaRPr lang="tr-TR"/>
           </a:p>
@@ -4582,7 +4590,7 @@
           <a:p>
             <a:fld id="{5CAD5305-01D2-4D2E-A617-8E49C3CC77B8}" type="datetimeFigureOut">
               <a:rPr lang="tr-TR" smtClean="0"/>
-              <a:t>1.09.2023</a:t>
+              <a:t>2.09.2023</a:t>
             </a:fld>
             <a:endParaRPr lang="tr-TR"/>
           </a:p>
@@ -5325,7 +5333,7 @@
           <a:p>
             <a:fld id="{5CAD5305-01D2-4D2E-A617-8E49C3CC77B8}" type="datetimeFigureOut">
               <a:rPr lang="tr-TR" smtClean="0"/>
-              <a:t>1.09.2023</a:t>
+              <a:t>2.09.2023</a:t>
             </a:fld>
             <a:endParaRPr lang="tr-TR"/>
           </a:p>
@@ -5865,7 +5873,12 @@
             <p:ph type="ctrTitle"/>
           </p:nvPr>
         </p:nvSpPr>
-        <p:spPr/>
+        <p:spPr>
+          <a:xfrm>
+            <a:off x="1507067" y="3238252"/>
+            <a:ext cx="7766936" cy="1646302"/>
+          </a:xfrm>
+        </p:spPr>
         <p:txBody>
           <a:bodyPr/>
           <a:lstStyle/>
@@ -5873,6 +5886,23 @@
             <a:r>
               <a:rPr lang="tr-TR" dirty="0"/>
               <a:t>İklim Değişikliği ve İstanbul</a:t>
+            </a:r>
+            <a:br>
+              <a:rPr lang="tr-TR" dirty="0"/>
+            </a:br>
+            <a:br>
+              <a:rPr lang="tr-TR" dirty="0"/>
+            </a:br>
+            <a:r>
+              <a:rPr lang="tr-TR" sz="2400" dirty="0"/>
+              <a:t>Emrecan Ulu</a:t>
+            </a:r>
+            <a:br>
+              <a:rPr lang="tr-TR" sz="2400" dirty="0"/>
+            </a:br>
+            <a:r>
+              <a:rPr lang="tr-TR" sz="2400" dirty="0"/>
+              <a:t>Çağrı Coşkun</a:t>
             </a:r>
           </a:p>
         </p:txBody>
@@ -5907,169 +5937,46 @@
           <a:chExt cx="0" cy="0"/>
         </a:xfrm>
       </p:grpSpPr>
-      <p:sp>
-        <p:nvSpPr>
-          <p:cNvPr id="2" name="Başlık 1">
+      <p:pic>
+        <p:nvPicPr>
+          <p:cNvPr id="5" name="Resim 4">
             <a:extLst>
               <a:ext uri="{FF2B5EF4-FFF2-40B4-BE49-F238E27FC236}">
-                <a16:creationId xmlns:a16="http://schemas.microsoft.com/office/drawing/2014/main" id="{3ACC7431-E00D-5006-99E3-4122781B374F}"/>
+                <a16:creationId xmlns:a16="http://schemas.microsoft.com/office/drawing/2014/main" id="{9A09A0E3-7079-999E-1A86-607000844BE8}"/>
               </a:ext>
             </a:extLst>
           </p:cNvPr>
-          <p:cNvSpPr>
-            <a:spLocks noGrp="1"/>
-          </p:cNvSpPr>
-          <p:nvPr>
-            <p:ph type="ctrTitle"/>
-          </p:nvPr>
-        </p:nvSpPr>
+          <p:cNvPicPr>
+            <a:picLocks noChangeAspect="1"/>
+          </p:cNvPicPr>
+          <p:nvPr/>
+        </p:nvPicPr>
+        <p:blipFill>
+          <a:blip r:embed="rId2">
+            <a:extLst>
+              <a:ext uri="{28A0092B-C50C-407E-A947-70E740481C1C}">
+                <a14:useLocalDpi xmlns:a14="http://schemas.microsoft.com/office/drawing/2010/main" val="0"/>
+              </a:ext>
+            </a:extLst>
+          </a:blip>
+          <a:stretch>
+            <a:fillRect/>
+          </a:stretch>
+        </p:blipFill>
         <p:spPr>
           <a:xfrm>
-            <a:off x="1441751" y="1436931"/>
-            <a:ext cx="8784599" cy="765111"/>
-          </a:xfrm>
-        </p:spPr>
-        <p:txBody>
-          <a:bodyPr/>
-          <a:lstStyle/>
-          <a:p>
-            <a:pPr algn="l"/>
-            <a:r>
-              <a:rPr lang="tr-TR" sz="4400" dirty="0"/>
-              <a:t>Ağaç ve Çalı İstatistikleri</a:t>
-            </a:r>
-          </a:p>
-        </p:txBody>
-      </p:sp>
-      <p:sp>
-        <p:nvSpPr>
-          <p:cNvPr id="3" name="Metin kutusu 2">
-            <a:extLst>
-              <a:ext uri="{FF2B5EF4-FFF2-40B4-BE49-F238E27FC236}">
-                <a16:creationId xmlns:a16="http://schemas.microsoft.com/office/drawing/2014/main" id="{57371B57-E141-CF01-DA62-9CAFA7D89C62}"/>
-              </a:ext>
-            </a:extLst>
-          </p:cNvPr>
-          <p:cNvSpPr txBox="1"/>
-          <p:nvPr/>
-        </p:nvSpPr>
-        <p:spPr>
-          <a:xfrm>
-            <a:off x="1441752" y="2480608"/>
-            <a:ext cx="7766936" cy="2862322"/>
+            <a:off x="952500" y="0"/>
+            <a:ext cx="10287000" cy="6858000"/>
           </a:xfrm>
           <a:prstGeom prst="rect">
             <a:avLst/>
           </a:prstGeom>
-          <a:noFill/>
         </p:spPr>
-        <p:txBody>
-          <a:bodyPr wrap="square" rtlCol="0">
-            <a:spAutoFit/>
-          </a:bodyPr>
-          <a:lstStyle/>
-          <a:p>
-            <a:pPr marL="285750" indent="-285750" algn="l">
-              <a:buFont typeface="Arial" panose="020B0604020202020204" pitchFamily="34" charset="0"/>
-              <a:buChar char="•"/>
-            </a:pPr>
-            <a:r>
-              <a:rPr lang="tr-TR" b="0" i="0" dirty="0">
-                <a:solidFill>
-                  <a:srgbClr val="374151"/>
-                </a:solidFill>
-                <a:effectLst/>
-                <a:latin typeface="Söhne"/>
-              </a:rPr>
-              <a:t>Ağaçlar ve çalılar, CO2 emerek atmosferdeki karbonu azaltarak küresel ısınmayı engellerler.</a:t>
-            </a:r>
-          </a:p>
-          <a:p>
-            <a:pPr marL="285750" indent="-285750" algn="l">
-              <a:buFont typeface="Arial" panose="020B0604020202020204" pitchFamily="34" charset="0"/>
-              <a:buChar char="•"/>
-            </a:pPr>
-            <a:r>
-              <a:rPr lang="tr-TR" b="0" i="0" dirty="0">
-                <a:solidFill>
-                  <a:srgbClr val="374151"/>
-                </a:solidFill>
-                <a:effectLst/>
-                <a:latin typeface="Söhne"/>
-              </a:rPr>
-              <a:t>Erozyonu önleyerek toprak kaybını engellerler ve bu, iklim değişikliği ile ilişkilendirilen sorunlara katkıda bulunur.</a:t>
-            </a:r>
-          </a:p>
-          <a:p>
-            <a:pPr marL="285750" indent="-285750" algn="l">
-              <a:buFont typeface="Arial" panose="020B0604020202020204" pitchFamily="34" charset="0"/>
-              <a:buChar char="•"/>
-            </a:pPr>
-            <a:r>
-              <a:rPr lang="tr-TR" b="0" i="0" dirty="0">
-                <a:solidFill>
-                  <a:srgbClr val="374151"/>
-                </a:solidFill>
-                <a:effectLst/>
-                <a:latin typeface="Söhne"/>
-              </a:rPr>
-              <a:t>Habitatlar ve biyoçeşitliliği destekler, küresel ısınmanın neden olduğu habitat değişikliklerini azaltır.</a:t>
-            </a:r>
-          </a:p>
-          <a:p>
-            <a:pPr marL="285750" indent="-285750" algn="l">
-              <a:buFont typeface="Arial" panose="020B0604020202020204" pitchFamily="34" charset="0"/>
-              <a:buChar char="•"/>
-            </a:pPr>
-            <a:r>
-              <a:rPr lang="tr-TR" b="0" i="0" dirty="0">
-                <a:solidFill>
-                  <a:srgbClr val="374151"/>
-                </a:solidFill>
-                <a:effectLst/>
-                <a:latin typeface="Söhne"/>
-              </a:rPr>
-              <a:t>Su döngüsünü düzenler, yerel iklimleri etkiler ve aşırı hava olaylarını azaltabilir.</a:t>
-            </a:r>
-          </a:p>
-          <a:p>
-            <a:pPr marL="285750" indent="-285750" algn="l">
-              <a:buFont typeface="Arial" panose="020B0604020202020204" pitchFamily="34" charset="0"/>
-              <a:buChar char="•"/>
-            </a:pPr>
-            <a:r>
-              <a:rPr lang="tr-TR" b="0" i="0" dirty="0">
-                <a:solidFill>
-                  <a:srgbClr val="374151"/>
-                </a:solidFill>
-                <a:effectLst/>
-                <a:latin typeface="Söhne"/>
-              </a:rPr>
-              <a:t>Sera gazlarının atmosfere salınımını azaltarak küresel ısınmayı yavaşlatır.</a:t>
-            </a:r>
-          </a:p>
-          <a:p>
-            <a:pPr marL="285750" indent="-285750" algn="l">
-              <a:buFont typeface="Arial" panose="020B0604020202020204" pitchFamily="34" charset="0"/>
-              <a:buChar char="•"/>
-            </a:pPr>
-            <a:r>
-              <a:rPr lang="tr-TR" b="0" i="0" dirty="0">
-                <a:solidFill>
-                  <a:srgbClr val="374151"/>
-                </a:solidFill>
-                <a:effectLst/>
-                <a:latin typeface="Söhne"/>
-              </a:rPr>
-              <a:t>Hava kalitesini iyileştirir ve insan sağlığına ve iklim değişikliği ile mücadeleye katkıda bulunur.</a:t>
-            </a:r>
-          </a:p>
-        </p:txBody>
-      </p:sp>
+      </p:pic>
     </p:spTree>
     <p:extLst>
       <p:ext uri="{BB962C8B-B14F-4D97-AF65-F5344CB8AC3E}">
-        <p14:creationId xmlns:p14="http://schemas.microsoft.com/office/powerpoint/2010/main" val="4248212955"/>
+        <p14:creationId xmlns:p14="http://schemas.microsoft.com/office/powerpoint/2010/main" val="554691366"/>
       </p:ext>
     </p:extLst>
   </p:cSld>
@@ -6098,10 +6005,10 @@
       </p:grpSpPr>
       <p:pic>
         <p:nvPicPr>
-          <p:cNvPr id="9" name="Resim 8">
+          <p:cNvPr id="5" name="Resim 4">
             <a:extLst>
               <a:ext uri="{FF2B5EF4-FFF2-40B4-BE49-F238E27FC236}">
-                <a16:creationId xmlns:a16="http://schemas.microsoft.com/office/drawing/2014/main" id="{3766583C-A847-E7DB-90E4-E93B080837CE}"/>
+                <a16:creationId xmlns:a16="http://schemas.microsoft.com/office/drawing/2014/main" id="{EC7DB25B-6184-B428-64F6-477CA95D44C8}"/>
               </a:ext>
             </a:extLst>
           </p:cNvPr>
@@ -6124,8 +6031,8 @@
         </p:blipFill>
         <p:spPr>
           <a:xfrm>
-            <a:off x="380999" y="0"/>
-            <a:ext cx="11430000" cy="6858000"/>
+            <a:off x="952500" y="0"/>
+            <a:ext cx="10287000" cy="6858000"/>
           </a:xfrm>
           <a:prstGeom prst="rect">
             <a:avLst/>
@@ -6135,7 +6042,7 @@
     </p:spTree>
     <p:extLst>
       <p:ext uri="{BB962C8B-B14F-4D97-AF65-F5344CB8AC3E}">
-        <p14:creationId xmlns:p14="http://schemas.microsoft.com/office/powerpoint/2010/main" val="172203605"/>
+        <p14:creationId xmlns:p14="http://schemas.microsoft.com/office/powerpoint/2010/main" val="4166325749"/>
       </p:ext>
     </p:extLst>
   </p:cSld>
@@ -6162,46 +6069,169 @@
           <a:chExt cx="0" cy="0"/>
         </a:xfrm>
       </p:grpSpPr>
-      <p:pic>
-        <p:nvPicPr>
-          <p:cNvPr id="5" name="Resim 4">
+      <p:sp>
+        <p:nvSpPr>
+          <p:cNvPr id="2" name="Başlık 1">
             <a:extLst>
               <a:ext uri="{FF2B5EF4-FFF2-40B4-BE49-F238E27FC236}">
-                <a16:creationId xmlns:a16="http://schemas.microsoft.com/office/drawing/2014/main" id="{6AC0C848-55AB-B9FD-7132-B1A9B54BA72C}"/>
+                <a16:creationId xmlns:a16="http://schemas.microsoft.com/office/drawing/2014/main" id="{3ACC7431-E00D-5006-99E3-4122781B374F}"/>
               </a:ext>
             </a:extLst>
           </p:cNvPr>
-          <p:cNvPicPr>
-            <a:picLocks noChangeAspect="1"/>
-          </p:cNvPicPr>
-          <p:nvPr/>
-        </p:nvPicPr>
-        <p:blipFill>
-          <a:blip r:embed="rId2">
-            <a:extLst>
-              <a:ext uri="{28A0092B-C50C-407E-A947-70E740481C1C}">
-                <a14:useLocalDpi xmlns:a14="http://schemas.microsoft.com/office/drawing/2010/main" val="0"/>
-              </a:ext>
-            </a:extLst>
-          </a:blip>
-          <a:stretch>
-            <a:fillRect/>
-          </a:stretch>
-        </p:blipFill>
+          <p:cNvSpPr>
+            <a:spLocks noGrp="1"/>
+          </p:cNvSpPr>
+          <p:nvPr>
+            <p:ph type="ctrTitle"/>
+          </p:nvPr>
+        </p:nvSpPr>
         <p:spPr>
           <a:xfrm>
-            <a:off x="380999" y="0"/>
-            <a:ext cx="11430000" cy="6858000"/>
+            <a:off x="1441751" y="1436931"/>
+            <a:ext cx="8784599" cy="765111"/>
+          </a:xfrm>
+        </p:spPr>
+        <p:txBody>
+          <a:bodyPr/>
+          <a:lstStyle/>
+          <a:p>
+            <a:pPr algn="l"/>
+            <a:r>
+              <a:rPr lang="tr-TR" sz="4400" dirty="0"/>
+              <a:t>Ağaç ve Çalı İstatistikleri</a:t>
+            </a:r>
+          </a:p>
+        </p:txBody>
+      </p:sp>
+      <p:sp>
+        <p:nvSpPr>
+          <p:cNvPr id="3" name="Metin kutusu 2">
+            <a:extLst>
+              <a:ext uri="{FF2B5EF4-FFF2-40B4-BE49-F238E27FC236}">
+                <a16:creationId xmlns:a16="http://schemas.microsoft.com/office/drawing/2014/main" id="{57371B57-E141-CF01-DA62-9CAFA7D89C62}"/>
+              </a:ext>
+            </a:extLst>
+          </p:cNvPr>
+          <p:cNvSpPr txBox="1"/>
+          <p:nvPr/>
+        </p:nvSpPr>
+        <p:spPr>
+          <a:xfrm>
+            <a:off x="1441752" y="2480608"/>
+            <a:ext cx="7766936" cy="2862322"/>
           </a:xfrm>
           <a:prstGeom prst="rect">
             <a:avLst/>
           </a:prstGeom>
+          <a:noFill/>
         </p:spPr>
-      </p:pic>
+        <p:txBody>
+          <a:bodyPr wrap="square" rtlCol="0">
+            <a:spAutoFit/>
+          </a:bodyPr>
+          <a:lstStyle/>
+          <a:p>
+            <a:pPr marL="285750" indent="-285750" algn="l">
+              <a:buFont typeface="Arial" panose="020B0604020202020204" pitchFamily="34" charset="0"/>
+              <a:buChar char="•"/>
+            </a:pPr>
+            <a:r>
+              <a:rPr lang="tr-TR" b="0" i="0" dirty="0">
+                <a:solidFill>
+                  <a:srgbClr val="374151"/>
+                </a:solidFill>
+                <a:effectLst/>
+                <a:latin typeface="Söhne"/>
+              </a:rPr>
+              <a:t>Ağaçlar ve çalılar, CO2 emerek atmosferdeki karbonu azaltarak küresel ısınmayı engellerler.</a:t>
+            </a:r>
+          </a:p>
+          <a:p>
+            <a:pPr marL="285750" indent="-285750" algn="l">
+              <a:buFont typeface="Arial" panose="020B0604020202020204" pitchFamily="34" charset="0"/>
+              <a:buChar char="•"/>
+            </a:pPr>
+            <a:r>
+              <a:rPr lang="tr-TR" b="0" i="0" dirty="0">
+                <a:solidFill>
+                  <a:srgbClr val="374151"/>
+                </a:solidFill>
+                <a:effectLst/>
+                <a:latin typeface="Söhne"/>
+              </a:rPr>
+              <a:t>Erozyonu önleyerek toprak kaybını engellerler ve bu, iklim değişikliği ile ilişkilendirilen sorunlara katkıda bulunur.</a:t>
+            </a:r>
+          </a:p>
+          <a:p>
+            <a:pPr marL="285750" indent="-285750" algn="l">
+              <a:buFont typeface="Arial" panose="020B0604020202020204" pitchFamily="34" charset="0"/>
+              <a:buChar char="•"/>
+            </a:pPr>
+            <a:r>
+              <a:rPr lang="tr-TR" b="0" i="0" dirty="0">
+                <a:solidFill>
+                  <a:srgbClr val="374151"/>
+                </a:solidFill>
+                <a:effectLst/>
+                <a:latin typeface="Söhne"/>
+              </a:rPr>
+              <a:t>Habitatlar ve biyoçeşitliliği destekler, küresel ısınmanın neden olduğu habitat değişikliklerini azaltır.</a:t>
+            </a:r>
+          </a:p>
+          <a:p>
+            <a:pPr marL="285750" indent="-285750" algn="l">
+              <a:buFont typeface="Arial" panose="020B0604020202020204" pitchFamily="34" charset="0"/>
+              <a:buChar char="•"/>
+            </a:pPr>
+            <a:r>
+              <a:rPr lang="tr-TR" b="0" i="0" dirty="0">
+                <a:solidFill>
+                  <a:srgbClr val="374151"/>
+                </a:solidFill>
+                <a:effectLst/>
+                <a:latin typeface="Söhne"/>
+              </a:rPr>
+              <a:t>Su döngüsünü düzenler, yerel iklimleri etkiler ve aşırı hava olaylarını azaltabilir.</a:t>
+            </a:r>
+          </a:p>
+          <a:p>
+            <a:pPr marL="285750" indent="-285750" algn="l">
+              <a:buFont typeface="Arial" panose="020B0604020202020204" pitchFamily="34" charset="0"/>
+              <a:buChar char="•"/>
+            </a:pPr>
+            <a:r>
+              <a:rPr lang="tr-TR" b="0" i="0" dirty="0">
+                <a:solidFill>
+                  <a:srgbClr val="374151"/>
+                </a:solidFill>
+                <a:effectLst/>
+                <a:latin typeface="Söhne"/>
+              </a:rPr>
+              <a:t>Sera gazlarının atmosfere salınımını azaltarak küresel ısınmayı yavaşlatır.</a:t>
+            </a:r>
+          </a:p>
+          <a:p>
+            <a:pPr marL="285750" indent="-285750" algn="l">
+              <a:buFont typeface="Arial" panose="020B0604020202020204" pitchFamily="34" charset="0"/>
+              <a:buChar char="•"/>
+            </a:pPr>
+            <a:r>
+              <a:rPr lang="tr-TR" b="0" i="0" dirty="0">
+                <a:solidFill>
+                  <a:srgbClr val="374151"/>
+                </a:solidFill>
+                <a:effectLst/>
+                <a:latin typeface="Söhne"/>
+              </a:rPr>
+              <a:t>Hava kalitesini iyileştirir ve insan sağlığına ve iklim değişikliği ile mücadeleye katkıda bulunur.</a:t>
+            </a:r>
+          </a:p>
+        </p:txBody>
+      </p:sp>
     </p:spTree>
     <p:extLst>
       <p:ext uri="{BB962C8B-B14F-4D97-AF65-F5344CB8AC3E}">
-        <p14:creationId xmlns:p14="http://schemas.microsoft.com/office/powerpoint/2010/main" val="2442458234"/>
+        <p14:creationId xmlns:p14="http://schemas.microsoft.com/office/powerpoint/2010/main" val="4248212955"/>
       </p:ext>
     </p:extLst>
   </p:cSld>
@@ -6230,10 +6260,10 @@
       </p:grpSpPr>
       <p:pic>
         <p:nvPicPr>
-          <p:cNvPr id="5" name="Resim 4">
+          <p:cNvPr id="9" name="Resim 8">
             <a:extLst>
               <a:ext uri="{FF2B5EF4-FFF2-40B4-BE49-F238E27FC236}">
-                <a16:creationId xmlns:a16="http://schemas.microsoft.com/office/drawing/2014/main" id="{CF7A0545-86C3-1672-99E8-1E1B6AFA206D}"/>
+                <a16:creationId xmlns:a16="http://schemas.microsoft.com/office/drawing/2014/main" id="{3766583C-A847-E7DB-90E4-E93B080837CE}"/>
               </a:ext>
             </a:extLst>
           </p:cNvPr>
@@ -6267,7 +6297,7 @@
     </p:spTree>
     <p:extLst>
       <p:ext uri="{BB962C8B-B14F-4D97-AF65-F5344CB8AC3E}">
-        <p14:creationId xmlns:p14="http://schemas.microsoft.com/office/powerpoint/2010/main" val="3059962689"/>
+        <p14:creationId xmlns:p14="http://schemas.microsoft.com/office/powerpoint/2010/main" val="172203605"/>
       </p:ext>
     </p:extLst>
   </p:cSld>
@@ -6296,10 +6326,10 @@
       </p:grpSpPr>
       <p:pic>
         <p:nvPicPr>
-          <p:cNvPr id="11" name="Resim 10">
+          <p:cNvPr id="5" name="Resim 4">
             <a:extLst>
               <a:ext uri="{FF2B5EF4-FFF2-40B4-BE49-F238E27FC236}">
-                <a16:creationId xmlns:a16="http://schemas.microsoft.com/office/drawing/2014/main" id="{1712DF8F-3E5D-2CC9-1723-4A471A0BD515}"/>
+                <a16:creationId xmlns:a16="http://schemas.microsoft.com/office/drawing/2014/main" id="{6AC0C848-55AB-B9FD-7132-B1A9B54BA72C}"/>
               </a:ext>
             </a:extLst>
           </p:cNvPr>
@@ -6322,8 +6352,8 @@
         </p:blipFill>
         <p:spPr>
           <a:xfrm>
-            <a:off x="952500" y="0"/>
-            <a:ext cx="10287000" cy="6858000"/>
+            <a:off x="380999" y="0"/>
+            <a:ext cx="11430000" cy="6858000"/>
           </a:xfrm>
           <a:prstGeom prst="rect">
             <a:avLst/>
@@ -6333,7 +6363,7 @@
     </p:spTree>
     <p:extLst>
       <p:ext uri="{BB962C8B-B14F-4D97-AF65-F5344CB8AC3E}">
-        <p14:creationId xmlns:p14="http://schemas.microsoft.com/office/powerpoint/2010/main" val="1268456151"/>
+        <p14:creationId xmlns:p14="http://schemas.microsoft.com/office/powerpoint/2010/main" val="2442458234"/>
       </p:ext>
     </p:extLst>
   </p:cSld>
@@ -6362,10 +6392,10 @@
       </p:grpSpPr>
       <p:pic>
         <p:nvPicPr>
-          <p:cNvPr id="7" name="Resim 6">
+          <p:cNvPr id="5" name="Resim 4">
             <a:extLst>
               <a:ext uri="{FF2B5EF4-FFF2-40B4-BE49-F238E27FC236}">
-                <a16:creationId xmlns:a16="http://schemas.microsoft.com/office/drawing/2014/main" id="{059A9369-2770-1BDB-8BAC-3ED2284F7F1D}"/>
+                <a16:creationId xmlns:a16="http://schemas.microsoft.com/office/drawing/2014/main" id="{CF7A0545-86C3-1672-99E8-1E1B6AFA206D}"/>
               </a:ext>
             </a:extLst>
           </p:cNvPr>
@@ -6388,8 +6418,8 @@
         </p:blipFill>
         <p:spPr>
           <a:xfrm>
-            <a:off x="952500" y="0"/>
-            <a:ext cx="10287000" cy="6858000"/>
+            <a:off x="380999" y="0"/>
+            <a:ext cx="11430000" cy="6858000"/>
           </a:xfrm>
           <a:prstGeom prst="rect">
             <a:avLst/>
@@ -6399,7 +6429,7 @@
     </p:spTree>
     <p:extLst>
       <p:ext uri="{BB962C8B-B14F-4D97-AF65-F5344CB8AC3E}">
-        <p14:creationId xmlns:p14="http://schemas.microsoft.com/office/powerpoint/2010/main" val="1056973564"/>
+        <p14:creationId xmlns:p14="http://schemas.microsoft.com/office/powerpoint/2010/main" val="3059962689"/>
       </p:ext>
     </p:extLst>
   </p:cSld>
@@ -6428,10 +6458,10 @@
       </p:grpSpPr>
       <p:pic>
         <p:nvPicPr>
-          <p:cNvPr id="5" name="Resim 4">
+          <p:cNvPr id="11" name="Resim 10">
             <a:extLst>
               <a:ext uri="{FF2B5EF4-FFF2-40B4-BE49-F238E27FC236}">
-                <a16:creationId xmlns:a16="http://schemas.microsoft.com/office/drawing/2014/main" id="{4BB7360C-617C-CFE0-96DC-7824CA63A736}"/>
+                <a16:creationId xmlns:a16="http://schemas.microsoft.com/office/drawing/2014/main" id="{1712DF8F-3E5D-2CC9-1723-4A471A0BD515}"/>
               </a:ext>
             </a:extLst>
           </p:cNvPr>
@@ -6465,7 +6495,7 @@
     </p:spTree>
     <p:extLst>
       <p:ext uri="{BB962C8B-B14F-4D97-AF65-F5344CB8AC3E}">
-        <p14:creationId xmlns:p14="http://schemas.microsoft.com/office/powerpoint/2010/main" val="2926348030"/>
+        <p14:creationId xmlns:p14="http://schemas.microsoft.com/office/powerpoint/2010/main" val="1268456151"/>
       </p:ext>
     </p:extLst>
   </p:cSld>
@@ -6494,10 +6524,10 @@
       </p:grpSpPr>
       <p:pic>
         <p:nvPicPr>
-          <p:cNvPr id="5" name="Resim 4">
+          <p:cNvPr id="7" name="Resim 6">
             <a:extLst>
               <a:ext uri="{FF2B5EF4-FFF2-40B4-BE49-F238E27FC236}">
-                <a16:creationId xmlns:a16="http://schemas.microsoft.com/office/drawing/2014/main" id="{3413B5D2-C3E3-B132-D2FC-E5EE158CEF33}"/>
+                <a16:creationId xmlns:a16="http://schemas.microsoft.com/office/drawing/2014/main" id="{059A9369-2770-1BDB-8BAC-3ED2284F7F1D}"/>
               </a:ext>
             </a:extLst>
           </p:cNvPr>
@@ -6520,8 +6550,8 @@
         </p:blipFill>
         <p:spPr>
           <a:xfrm>
-            <a:off x="380999" y="0"/>
-            <a:ext cx="11430000" cy="6858000"/>
+            <a:off x="952500" y="0"/>
+            <a:ext cx="10287000" cy="6858000"/>
           </a:xfrm>
           <a:prstGeom prst="rect">
             <a:avLst/>
@@ -6531,7 +6561,7 @@
     </p:spTree>
     <p:extLst>
       <p:ext uri="{BB962C8B-B14F-4D97-AF65-F5344CB8AC3E}">
-        <p14:creationId xmlns:p14="http://schemas.microsoft.com/office/powerpoint/2010/main" val="3681573254"/>
+        <p14:creationId xmlns:p14="http://schemas.microsoft.com/office/powerpoint/2010/main" val="1056973564"/>
       </p:ext>
     </p:extLst>
   </p:cSld>
@@ -6558,175 +6588,46 @@
           <a:chExt cx="0" cy="0"/>
         </a:xfrm>
       </p:grpSpPr>
-      <p:sp>
-        <p:nvSpPr>
-          <p:cNvPr id="2" name="Başlık 1">
+      <p:pic>
+        <p:nvPicPr>
+          <p:cNvPr id="5" name="Resim 4">
             <a:extLst>
               <a:ext uri="{FF2B5EF4-FFF2-40B4-BE49-F238E27FC236}">
-                <a16:creationId xmlns:a16="http://schemas.microsoft.com/office/drawing/2014/main" id="{3ACC7431-E00D-5006-99E3-4122781B374F}"/>
+                <a16:creationId xmlns:a16="http://schemas.microsoft.com/office/drawing/2014/main" id="{4BB7360C-617C-CFE0-96DC-7824CA63A736}"/>
               </a:ext>
             </a:extLst>
           </p:cNvPr>
-          <p:cNvSpPr>
-            <a:spLocks noGrp="1"/>
-          </p:cNvSpPr>
-          <p:nvPr>
-            <p:ph type="ctrTitle"/>
-          </p:nvPr>
-        </p:nvSpPr>
+          <p:cNvPicPr>
+            <a:picLocks noChangeAspect="1"/>
+          </p:cNvPicPr>
+          <p:nvPr/>
+        </p:nvPicPr>
+        <p:blipFill>
+          <a:blip r:embed="rId2">
+            <a:extLst>
+              <a:ext uri="{28A0092B-C50C-407E-A947-70E740481C1C}">
+                <a14:useLocalDpi xmlns:a14="http://schemas.microsoft.com/office/drawing/2010/main" val="0"/>
+              </a:ext>
+            </a:extLst>
+          </a:blip>
+          <a:stretch>
+            <a:fillRect/>
+          </a:stretch>
+        </p:blipFill>
         <p:spPr>
           <a:xfrm>
-            <a:off x="1441751" y="1436931"/>
-            <a:ext cx="8784599" cy="765111"/>
-          </a:xfrm>
-        </p:spPr>
-        <p:txBody>
-          <a:bodyPr/>
-          <a:lstStyle/>
-          <a:p>
-            <a:pPr algn="l"/>
-            <a:r>
-              <a:rPr lang="tr-TR" sz="4400" dirty="0"/>
-              <a:t>Su İstatistikleri</a:t>
-            </a:r>
-          </a:p>
-        </p:txBody>
-      </p:sp>
-      <p:sp>
-        <p:nvSpPr>
-          <p:cNvPr id="3" name="Metin kutusu 2">
-            <a:extLst>
-              <a:ext uri="{FF2B5EF4-FFF2-40B4-BE49-F238E27FC236}">
-                <a16:creationId xmlns:a16="http://schemas.microsoft.com/office/drawing/2014/main" id="{57371B57-E141-CF01-DA62-9CAFA7D89C62}"/>
-              </a:ext>
-            </a:extLst>
-          </p:cNvPr>
-          <p:cNvSpPr txBox="1"/>
-          <p:nvPr/>
-        </p:nvSpPr>
-        <p:spPr>
-          <a:xfrm>
-            <a:off x="1441752" y="2480608"/>
-            <a:ext cx="7766936" cy="2031325"/>
+            <a:off x="952500" y="0"/>
+            <a:ext cx="10287000" cy="6858000"/>
           </a:xfrm>
           <a:prstGeom prst="rect">
             <a:avLst/>
           </a:prstGeom>
-          <a:noFill/>
         </p:spPr>
-        <p:txBody>
-          <a:bodyPr wrap="square" rtlCol="0">
-            <a:spAutoFit/>
-          </a:bodyPr>
-          <a:lstStyle/>
-          <a:p>
-            <a:pPr marL="285750" indent="-285750" algn="l">
-              <a:buFont typeface="Arial" panose="020B0604020202020204" pitchFamily="34" charset="0"/>
-              <a:buChar char="•"/>
-            </a:pPr>
-            <a:r>
-              <a:rPr lang="tr-TR" b="0" i="0" dirty="0">
-                <a:solidFill>
-                  <a:srgbClr val="374151"/>
-                </a:solidFill>
-                <a:effectLst/>
-                <a:latin typeface="Söhne"/>
-              </a:rPr>
-              <a:t>Küresel ısınma, kuraklık riskini artırarak su kaynaklarını tehdit eder.</a:t>
-            </a:r>
-          </a:p>
-          <a:p>
-            <a:pPr marL="285750" indent="-285750" algn="l">
-              <a:buFont typeface="Arial" panose="020B0604020202020204" pitchFamily="34" charset="0"/>
-              <a:buChar char="•"/>
-            </a:pPr>
-            <a:r>
-              <a:rPr lang="tr-TR" b="0" i="0" dirty="0">
-                <a:solidFill>
-                  <a:srgbClr val="374151"/>
-                </a:solidFill>
-                <a:effectLst/>
-                <a:latin typeface="Söhne"/>
-              </a:rPr>
-              <a:t>Yükselen deniz seviyeleri, fırtınaların ve taşkınların etkilerini artırabilir.</a:t>
-            </a:r>
-            <a:endParaRPr lang="tr-TR" dirty="0">
-              <a:solidFill>
-                <a:srgbClr val="374151"/>
-              </a:solidFill>
-              <a:latin typeface="Söhne"/>
-            </a:endParaRPr>
-          </a:p>
-          <a:p>
-            <a:pPr marL="285750" indent="-285750" algn="l">
-              <a:buFont typeface="Arial" panose="020B0604020202020204" pitchFamily="34" charset="0"/>
-              <a:buChar char="•"/>
-            </a:pPr>
-            <a:r>
-              <a:rPr lang="tr-TR" b="0" i="0" dirty="0">
-                <a:solidFill>
-                  <a:srgbClr val="374151"/>
-                </a:solidFill>
-                <a:effectLst/>
-                <a:latin typeface="Söhne"/>
-              </a:rPr>
-              <a:t>Su buharı, sera etkisini artırarak küresel ısınmanın sürmesine katkı sağlar.</a:t>
-            </a:r>
-          </a:p>
-          <a:p>
-            <a:pPr marL="285750" indent="-285750" algn="l">
-              <a:buFont typeface="Arial" panose="020B0604020202020204" pitchFamily="34" charset="0"/>
-              <a:buChar char="•"/>
-            </a:pPr>
-            <a:r>
-              <a:rPr lang="tr-TR" b="0" i="0" dirty="0">
-                <a:solidFill>
-                  <a:srgbClr val="374151"/>
-                </a:solidFill>
-                <a:effectLst/>
-                <a:latin typeface="Söhne"/>
-              </a:rPr>
-              <a:t>Suyun sıcaklığı, tatlı su ekosistemlerini ve balık türlerini etkiler.</a:t>
-            </a:r>
-          </a:p>
-          <a:p>
-            <a:pPr marL="285750" indent="-285750" algn="l">
-              <a:buFont typeface="Arial" panose="020B0604020202020204" pitchFamily="34" charset="0"/>
-              <a:buChar char="•"/>
-            </a:pPr>
-            <a:r>
-              <a:rPr lang="tr-TR" b="0" i="0" dirty="0">
-                <a:solidFill>
-                  <a:srgbClr val="374151"/>
-                </a:solidFill>
-                <a:effectLst/>
-                <a:latin typeface="Söhne"/>
-              </a:rPr>
-              <a:t>Küresel ısınma, deniz sularının ısınmasına neden olarak deniz yaşamını etkiler.</a:t>
-            </a:r>
-          </a:p>
-          <a:p>
-            <a:pPr marL="285750" indent="-285750" algn="l">
-              <a:buFont typeface="Arial" panose="020B0604020202020204" pitchFamily="34" charset="0"/>
-              <a:buChar char="•"/>
-            </a:pPr>
-            <a:r>
-              <a:rPr lang="tr-TR" b="0" i="0" dirty="0">
-                <a:solidFill>
-                  <a:srgbClr val="374151"/>
-                </a:solidFill>
-                <a:effectLst/>
-                <a:latin typeface="Söhne"/>
-              </a:rPr>
-              <a:t>Buzulların erimesi sonucu deniz seviyelerinin yükselmesi, kıyı bölgelerini tehdit eder.</a:t>
-            </a:r>
-          </a:p>
-        </p:txBody>
-      </p:sp>
+      </p:pic>
     </p:spTree>
     <p:extLst>
       <p:ext uri="{BB962C8B-B14F-4D97-AF65-F5344CB8AC3E}">
-        <p14:creationId xmlns:p14="http://schemas.microsoft.com/office/powerpoint/2010/main" val="2224808125"/>
+        <p14:creationId xmlns:p14="http://schemas.microsoft.com/office/powerpoint/2010/main" val="2926348030"/>
       </p:ext>
     </p:extLst>
   </p:cSld>
@@ -6758,7 +6659,7 @@
           <p:cNvPr id="5" name="Resim 4">
             <a:extLst>
               <a:ext uri="{FF2B5EF4-FFF2-40B4-BE49-F238E27FC236}">
-                <a16:creationId xmlns:a16="http://schemas.microsoft.com/office/drawing/2014/main" id="{0B9FEB63-4986-8EF0-7C3B-64E76608F704}"/>
+                <a16:creationId xmlns:a16="http://schemas.microsoft.com/office/drawing/2014/main" id="{3413B5D2-C3E3-B132-D2FC-E5EE158CEF33}"/>
               </a:ext>
             </a:extLst>
           </p:cNvPr>
@@ -6792,7 +6693,7 @@
     </p:spTree>
     <p:extLst>
       <p:ext uri="{BB962C8B-B14F-4D97-AF65-F5344CB8AC3E}">
-        <p14:creationId xmlns:p14="http://schemas.microsoft.com/office/powerpoint/2010/main" val="1425848926"/>
+        <p14:creationId xmlns:p14="http://schemas.microsoft.com/office/powerpoint/2010/main" val="3681573254"/>
       </p:ext>
     </p:extLst>
   </p:cSld>
@@ -6987,46 +6888,175 @@
           <a:chExt cx="0" cy="0"/>
         </a:xfrm>
       </p:grpSpPr>
-      <p:pic>
-        <p:nvPicPr>
-          <p:cNvPr id="5" name="Resim 4">
+      <p:sp>
+        <p:nvSpPr>
+          <p:cNvPr id="2" name="Başlık 1">
             <a:extLst>
               <a:ext uri="{FF2B5EF4-FFF2-40B4-BE49-F238E27FC236}">
-                <a16:creationId xmlns:a16="http://schemas.microsoft.com/office/drawing/2014/main" id="{031C5ED9-E07C-B9C7-6D91-247FF85FBA8B}"/>
+                <a16:creationId xmlns:a16="http://schemas.microsoft.com/office/drawing/2014/main" id="{3ACC7431-E00D-5006-99E3-4122781B374F}"/>
               </a:ext>
             </a:extLst>
           </p:cNvPr>
-          <p:cNvPicPr>
-            <a:picLocks noChangeAspect="1"/>
-          </p:cNvPicPr>
-          <p:nvPr/>
-        </p:nvPicPr>
-        <p:blipFill>
-          <a:blip r:embed="rId2">
-            <a:extLst>
-              <a:ext uri="{28A0092B-C50C-407E-A947-70E740481C1C}">
-                <a14:useLocalDpi xmlns:a14="http://schemas.microsoft.com/office/drawing/2010/main" val="0"/>
-              </a:ext>
-            </a:extLst>
-          </a:blip>
-          <a:stretch>
-            <a:fillRect/>
-          </a:stretch>
-        </p:blipFill>
+          <p:cNvSpPr>
+            <a:spLocks noGrp="1"/>
+          </p:cNvSpPr>
+          <p:nvPr>
+            <p:ph type="ctrTitle"/>
+          </p:nvPr>
+        </p:nvSpPr>
         <p:spPr>
           <a:xfrm>
-            <a:off x="380999" y="0"/>
-            <a:ext cx="11430000" cy="6858000"/>
+            <a:off x="1441751" y="1436931"/>
+            <a:ext cx="8784599" cy="765111"/>
+          </a:xfrm>
+        </p:spPr>
+        <p:txBody>
+          <a:bodyPr/>
+          <a:lstStyle/>
+          <a:p>
+            <a:pPr algn="l"/>
+            <a:r>
+              <a:rPr lang="tr-TR" sz="4400" dirty="0"/>
+              <a:t>Su İstatistikleri</a:t>
+            </a:r>
+          </a:p>
+        </p:txBody>
+      </p:sp>
+      <p:sp>
+        <p:nvSpPr>
+          <p:cNvPr id="3" name="Metin kutusu 2">
+            <a:extLst>
+              <a:ext uri="{FF2B5EF4-FFF2-40B4-BE49-F238E27FC236}">
+                <a16:creationId xmlns:a16="http://schemas.microsoft.com/office/drawing/2014/main" id="{57371B57-E141-CF01-DA62-9CAFA7D89C62}"/>
+              </a:ext>
+            </a:extLst>
+          </p:cNvPr>
+          <p:cNvSpPr txBox="1"/>
+          <p:nvPr/>
+        </p:nvSpPr>
+        <p:spPr>
+          <a:xfrm>
+            <a:off x="1441752" y="2480608"/>
+            <a:ext cx="7766936" cy="2031325"/>
           </a:xfrm>
           <a:prstGeom prst="rect">
             <a:avLst/>
           </a:prstGeom>
+          <a:noFill/>
         </p:spPr>
-      </p:pic>
+        <p:txBody>
+          <a:bodyPr wrap="square" rtlCol="0">
+            <a:spAutoFit/>
+          </a:bodyPr>
+          <a:lstStyle/>
+          <a:p>
+            <a:pPr marL="285750" indent="-285750" algn="l">
+              <a:buFont typeface="Arial" panose="020B0604020202020204" pitchFamily="34" charset="0"/>
+              <a:buChar char="•"/>
+            </a:pPr>
+            <a:r>
+              <a:rPr lang="tr-TR" b="0" i="0" dirty="0">
+                <a:solidFill>
+                  <a:srgbClr val="374151"/>
+                </a:solidFill>
+                <a:effectLst/>
+                <a:latin typeface="Söhne"/>
+              </a:rPr>
+              <a:t>Küresel ısınma, kuraklık riskini artırarak su kaynaklarını tehdit eder.</a:t>
+            </a:r>
+          </a:p>
+          <a:p>
+            <a:pPr marL="285750" indent="-285750" algn="l">
+              <a:buFont typeface="Arial" panose="020B0604020202020204" pitchFamily="34" charset="0"/>
+              <a:buChar char="•"/>
+            </a:pPr>
+            <a:r>
+              <a:rPr lang="tr-TR" b="0" i="0" dirty="0">
+                <a:solidFill>
+                  <a:srgbClr val="374151"/>
+                </a:solidFill>
+                <a:effectLst/>
+                <a:latin typeface="Söhne"/>
+              </a:rPr>
+              <a:t>Yükselen deniz seviyeleri, fırtınaların ve taşkınların etkilerini artırabilir.</a:t>
+            </a:r>
+            <a:endParaRPr lang="tr-TR" dirty="0">
+              <a:solidFill>
+                <a:srgbClr val="374151"/>
+              </a:solidFill>
+              <a:latin typeface="Söhne"/>
+            </a:endParaRPr>
+          </a:p>
+          <a:p>
+            <a:pPr marL="285750" indent="-285750" algn="l">
+              <a:buFont typeface="Arial" panose="020B0604020202020204" pitchFamily="34" charset="0"/>
+              <a:buChar char="•"/>
+            </a:pPr>
+            <a:r>
+              <a:rPr lang="tr-TR" b="0" i="0" dirty="0">
+                <a:solidFill>
+                  <a:srgbClr val="374151"/>
+                </a:solidFill>
+                <a:effectLst/>
+                <a:latin typeface="Söhne"/>
+              </a:rPr>
+              <a:t>Su buharı, sera etkisini artırarak küresel ısınmanın sürmesine katkı sağlar.</a:t>
+            </a:r>
+          </a:p>
+          <a:p>
+            <a:pPr marL="285750" indent="-285750" algn="l">
+              <a:buFont typeface="Arial" panose="020B0604020202020204" pitchFamily="34" charset="0"/>
+              <a:buChar char="•"/>
+            </a:pPr>
+            <a:r>
+              <a:rPr lang="tr-TR" b="0" i="0" dirty="0">
+                <a:solidFill>
+                  <a:srgbClr val="374151"/>
+                </a:solidFill>
+                <a:effectLst/>
+                <a:latin typeface="Söhne"/>
+              </a:rPr>
+              <a:t>Suyun sıcaklığı, tatlı su ekosistemlerini ve balık türlerini etkiler.</a:t>
+            </a:r>
+          </a:p>
+          <a:p>
+            <a:pPr marL="285750" indent="-285750" algn="l">
+              <a:buFont typeface="Arial" panose="020B0604020202020204" pitchFamily="34" charset="0"/>
+              <a:buChar char="•"/>
+            </a:pPr>
+            <a:r>
+              <a:rPr lang="tr-TR" b="0" i="0" dirty="0">
+                <a:solidFill>
+                  <a:srgbClr val="374151"/>
+                </a:solidFill>
+                <a:effectLst/>
+                <a:latin typeface="Söhne"/>
+              </a:rPr>
+              <a:t>Küresel ısınma, deniz sularının ısınmasına neden olarak deniz yaşamını etkiler.</a:t>
+            </a:r>
+          </a:p>
+          <a:p>
+            <a:pPr marL="285750" indent="-285750" algn="l">
+              <a:buFont typeface="Arial" panose="020B0604020202020204" pitchFamily="34" charset="0"/>
+              <a:buChar char="•"/>
+            </a:pPr>
+            <a:r>
+              <a:rPr lang="tr-TR" b="0" i="0" dirty="0">
+                <a:solidFill>
+                  <a:srgbClr val="374151"/>
+                </a:solidFill>
+                <a:effectLst/>
+                <a:latin typeface="Söhne"/>
+              </a:rPr>
+              <a:t>Buzulların erimesi sonucu deniz seviyelerinin yükselmesi, kıyı bölgelerini tehdit eder.</a:t>
+            </a:r>
+          </a:p>
+        </p:txBody>
+      </p:sp>
     </p:spTree>
     <p:extLst>
       <p:ext uri="{BB962C8B-B14F-4D97-AF65-F5344CB8AC3E}">
-        <p14:creationId xmlns:p14="http://schemas.microsoft.com/office/powerpoint/2010/main" val="1368511511"/>
+        <p14:creationId xmlns:p14="http://schemas.microsoft.com/office/powerpoint/2010/main" val="2224808125"/>
       </p:ext>
     </p:extLst>
   </p:cSld>
@@ -7055,10 +7085,10 @@
       </p:grpSpPr>
       <p:pic>
         <p:nvPicPr>
-          <p:cNvPr id="7" name="Resim 6">
+          <p:cNvPr id="5" name="Resim 4">
             <a:extLst>
               <a:ext uri="{FF2B5EF4-FFF2-40B4-BE49-F238E27FC236}">
-                <a16:creationId xmlns:a16="http://schemas.microsoft.com/office/drawing/2014/main" id="{5D7E3105-B993-5ABF-FC42-327480809364}"/>
+                <a16:creationId xmlns:a16="http://schemas.microsoft.com/office/drawing/2014/main" id="{0B9FEB63-4986-8EF0-7C3B-64E76608F704}"/>
               </a:ext>
             </a:extLst>
           </p:cNvPr>
@@ -7092,7 +7122,1075 @@
     </p:spTree>
     <p:extLst>
       <p:ext uri="{BB962C8B-B14F-4D97-AF65-F5344CB8AC3E}">
+        <p14:creationId xmlns:p14="http://schemas.microsoft.com/office/powerpoint/2010/main" val="1425848926"/>
+      </p:ext>
+    </p:extLst>
+  </p:cSld>
+  <p:clrMapOvr>
+    <a:masterClrMapping/>
+  </p:clrMapOvr>
+</p:sld>
+</file>
+
+<file path=ppt/slides/slide22.xml><?xml version="1.0" encoding="utf-8"?>
+<p:sld xmlns:a="http://schemas.openxmlformats.org/drawingml/2006/main" xmlns:r="http://schemas.openxmlformats.org/officeDocument/2006/relationships" xmlns:p="http://schemas.openxmlformats.org/presentationml/2006/main">
+  <p:cSld>
+    <p:spTree>
+      <p:nvGrpSpPr>
+        <p:cNvPr id="1" name=""/>
+        <p:cNvGrpSpPr/>
+        <p:nvPr/>
+      </p:nvGrpSpPr>
+      <p:grpSpPr>
+        <a:xfrm>
+          <a:off x="0" y="0"/>
+          <a:ext cx="0" cy="0"/>
+          <a:chOff x="0" y="0"/>
+          <a:chExt cx="0" cy="0"/>
+        </a:xfrm>
+      </p:grpSpPr>
+      <p:pic>
+        <p:nvPicPr>
+          <p:cNvPr id="5" name="Resim 4">
+            <a:extLst>
+              <a:ext uri="{FF2B5EF4-FFF2-40B4-BE49-F238E27FC236}">
+                <a16:creationId xmlns:a16="http://schemas.microsoft.com/office/drawing/2014/main" id="{031C5ED9-E07C-B9C7-6D91-247FF85FBA8B}"/>
+              </a:ext>
+            </a:extLst>
+          </p:cNvPr>
+          <p:cNvPicPr>
+            <a:picLocks noChangeAspect="1"/>
+          </p:cNvPicPr>
+          <p:nvPr/>
+        </p:nvPicPr>
+        <p:blipFill>
+          <a:blip r:embed="rId2">
+            <a:extLst>
+              <a:ext uri="{28A0092B-C50C-407E-A947-70E740481C1C}">
+                <a14:useLocalDpi xmlns:a14="http://schemas.microsoft.com/office/drawing/2010/main" val="0"/>
+              </a:ext>
+            </a:extLst>
+          </a:blip>
+          <a:stretch>
+            <a:fillRect/>
+          </a:stretch>
+        </p:blipFill>
+        <p:spPr>
+          <a:xfrm>
+            <a:off x="380999" y="0"/>
+            <a:ext cx="11430000" cy="6858000"/>
+          </a:xfrm>
+          <a:prstGeom prst="rect">
+            <a:avLst/>
+          </a:prstGeom>
+        </p:spPr>
+      </p:pic>
+    </p:spTree>
+    <p:extLst>
+      <p:ext uri="{BB962C8B-B14F-4D97-AF65-F5344CB8AC3E}">
+        <p14:creationId xmlns:p14="http://schemas.microsoft.com/office/powerpoint/2010/main" val="1368511511"/>
+      </p:ext>
+    </p:extLst>
+  </p:cSld>
+  <p:clrMapOvr>
+    <a:masterClrMapping/>
+  </p:clrMapOvr>
+</p:sld>
+</file>
+
+<file path=ppt/slides/slide23.xml><?xml version="1.0" encoding="utf-8"?>
+<p:sld xmlns:a="http://schemas.openxmlformats.org/drawingml/2006/main" xmlns:r="http://schemas.openxmlformats.org/officeDocument/2006/relationships" xmlns:p="http://schemas.openxmlformats.org/presentationml/2006/main">
+  <p:cSld>
+    <p:spTree>
+      <p:nvGrpSpPr>
+        <p:cNvPr id="1" name=""/>
+        <p:cNvGrpSpPr/>
+        <p:nvPr/>
+      </p:nvGrpSpPr>
+      <p:grpSpPr>
+        <a:xfrm>
+          <a:off x="0" y="0"/>
+          <a:ext cx="0" cy="0"/>
+          <a:chOff x="0" y="0"/>
+          <a:chExt cx="0" cy="0"/>
+        </a:xfrm>
+      </p:grpSpPr>
+      <p:pic>
+        <p:nvPicPr>
+          <p:cNvPr id="7" name="Resim 6">
+            <a:extLst>
+              <a:ext uri="{FF2B5EF4-FFF2-40B4-BE49-F238E27FC236}">
+                <a16:creationId xmlns:a16="http://schemas.microsoft.com/office/drawing/2014/main" id="{5D7E3105-B993-5ABF-FC42-327480809364}"/>
+              </a:ext>
+            </a:extLst>
+          </p:cNvPr>
+          <p:cNvPicPr>
+            <a:picLocks noChangeAspect="1"/>
+          </p:cNvPicPr>
+          <p:nvPr/>
+        </p:nvPicPr>
+        <p:blipFill>
+          <a:blip r:embed="rId2">
+            <a:extLst>
+              <a:ext uri="{28A0092B-C50C-407E-A947-70E740481C1C}">
+                <a14:useLocalDpi xmlns:a14="http://schemas.microsoft.com/office/drawing/2010/main" val="0"/>
+              </a:ext>
+            </a:extLst>
+          </a:blip>
+          <a:stretch>
+            <a:fillRect/>
+          </a:stretch>
+        </p:blipFill>
+        <p:spPr>
+          <a:xfrm>
+            <a:off x="380999" y="0"/>
+            <a:ext cx="11430000" cy="6858000"/>
+          </a:xfrm>
+          <a:prstGeom prst="rect">
+            <a:avLst/>
+          </a:prstGeom>
+        </p:spPr>
+      </p:pic>
+    </p:spTree>
+    <p:extLst>
+      <p:ext uri="{BB962C8B-B14F-4D97-AF65-F5344CB8AC3E}">
         <p14:creationId xmlns:p14="http://schemas.microsoft.com/office/powerpoint/2010/main" val="459291869"/>
+      </p:ext>
+    </p:extLst>
+  </p:cSld>
+  <p:clrMapOvr>
+    <a:masterClrMapping/>
+  </p:clrMapOvr>
+</p:sld>
+</file>
+
+<file path=ppt/slides/slide24.xml><?xml version="1.0" encoding="utf-8"?>
+<p:sld xmlns:a="http://schemas.openxmlformats.org/drawingml/2006/main" xmlns:r="http://schemas.openxmlformats.org/officeDocument/2006/relationships" xmlns:p="http://schemas.openxmlformats.org/presentationml/2006/main">
+  <p:cSld>
+    <p:spTree>
+      <p:nvGrpSpPr>
+        <p:cNvPr id="1" name=""/>
+        <p:cNvGrpSpPr/>
+        <p:nvPr/>
+      </p:nvGrpSpPr>
+      <p:grpSpPr>
+        <a:xfrm>
+          <a:off x="0" y="0"/>
+          <a:ext cx="0" cy="0"/>
+          <a:chOff x="0" y="0"/>
+          <a:chExt cx="0" cy="0"/>
+        </a:xfrm>
+      </p:grpSpPr>
+      <p:sp>
+        <p:nvSpPr>
+          <p:cNvPr id="2" name="Başlık 1">
+            <a:extLst>
+              <a:ext uri="{FF2B5EF4-FFF2-40B4-BE49-F238E27FC236}">
+                <a16:creationId xmlns:a16="http://schemas.microsoft.com/office/drawing/2014/main" id="{3ACC7431-E00D-5006-99E3-4122781B374F}"/>
+              </a:ext>
+            </a:extLst>
+          </p:cNvPr>
+          <p:cNvSpPr>
+            <a:spLocks noGrp="1"/>
+          </p:cNvSpPr>
+          <p:nvPr>
+            <p:ph type="ctrTitle"/>
+          </p:nvPr>
+        </p:nvSpPr>
+        <p:spPr>
+          <a:xfrm>
+            <a:off x="1441751" y="1436931"/>
+            <a:ext cx="8784599" cy="765111"/>
+          </a:xfrm>
+        </p:spPr>
+        <p:txBody>
+          <a:bodyPr/>
+          <a:lstStyle/>
+          <a:p>
+            <a:pPr algn="l"/>
+            <a:r>
+              <a:rPr lang="tr-TR" sz="4400" dirty="0"/>
+              <a:t>Trafik İstatistikleri</a:t>
+            </a:r>
+          </a:p>
+        </p:txBody>
+      </p:sp>
+      <p:sp>
+        <p:nvSpPr>
+          <p:cNvPr id="3" name="Metin kutusu 2">
+            <a:extLst>
+              <a:ext uri="{FF2B5EF4-FFF2-40B4-BE49-F238E27FC236}">
+                <a16:creationId xmlns:a16="http://schemas.microsoft.com/office/drawing/2014/main" id="{57371B57-E141-CF01-DA62-9CAFA7D89C62}"/>
+              </a:ext>
+            </a:extLst>
+          </p:cNvPr>
+          <p:cNvSpPr txBox="1"/>
+          <p:nvPr/>
+        </p:nvSpPr>
+        <p:spPr>
+          <a:xfrm>
+            <a:off x="1441752" y="2480608"/>
+            <a:ext cx="7766936" cy="2862322"/>
+          </a:xfrm>
+          <a:prstGeom prst="rect">
+            <a:avLst/>
+          </a:prstGeom>
+          <a:noFill/>
+        </p:spPr>
+        <p:txBody>
+          <a:bodyPr wrap="square" rtlCol="0">
+            <a:spAutoFit/>
+          </a:bodyPr>
+          <a:lstStyle/>
+          <a:p>
+            <a:pPr marL="285750" indent="-285750" algn="l">
+              <a:buFont typeface="Arial" panose="020B0604020202020204" pitchFamily="34" charset="0"/>
+              <a:buChar char="•"/>
+            </a:pPr>
+            <a:r>
+              <a:rPr lang="tr-TR" b="0" i="0" dirty="0">
+                <a:solidFill>
+                  <a:srgbClr val="374151"/>
+                </a:solidFill>
+                <a:effectLst/>
+                <a:latin typeface="Söhne"/>
+              </a:rPr>
+              <a:t>Trafik, fosil yakıtların kullanımından kaynaklanan karbon dioksit salınımı ile iklim değişikliğine katkıda bulunur.</a:t>
+            </a:r>
+          </a:p>
+          <a:p>
+            <a:pPr marL="285750" indent="-285750" algn="l">
+              <a:buFont typeface="Arial" panose="020B0604020202020204" pitchFamily="34" charset="0"/>
+              <a:buChar char="•"/>
+            </a:pPr>
+            <a:r>
+              <a:rPr lang="tr-TR" b="0" i="0" dirty="0">
+                <a:solidFill>
+                  <a:srgbClr val="374151"/>
+                </a:solidFill>
+                <a:effectLst/>
+                <a:latin typeface="Söhne"/>
+              </a:rPr>
+              <a:t>Trafik, kirli hava emisyonlarına yol açarak hava kalitesini olumsuz etkiler ve sağlık sorunlarına neden olabilir.</a:t>
+            </a:r>
+          </a:p>
+          <a:p>
+            <a:pPr marL="285750" indent="-285750" algn="l">
+              <a:buFont typeface="Arial" panose="020B0604020202020204" pitchFamily="34" charset="0"/>
+              <a:buChar char="•"/>
+            </a:pPr>
+            <a:r>
+              <a:rPr lang="tr-TR" b="0" i="0" dirty="0">
+                <a:solidFill>
+                  <a:srgbClr val="374151"/>
+                </a:solidFill>
+                <a:effectLst/>
+                <a:latin typeface="Söhne"/>
+              </a:rPr>
+              <a:t>Yoğun trafik, daha fazla enerji tüketimine neden olur ve bu da sera gazı emisyonlarını artırır.</a:t>
+            </a:r>
+          </a:p>
+          <a:p>
+            <a:pPr marL="285750" indent="-285750" algn="l">
+              <a:buFont typeface="Arial" panose="020B0604020202020204" pitchFamily="34" charset="0"/>
+              <a:buChar char="•"/>
+            </a:pPr>
+            <a:r>
+              <a:rPr lang="tr-TR" b="0" i="0" dirty="0">
+                <a:solidFill>
+                  <a:srgbClr val="374151"/>
+                </a:solidFill>
+                <a:effectLst/>
+                <a:latin typeface="Söhne"/>
+              </a:rPr>
+              <a:t>İyi planlanmış şehirler, çevre dostu ulaşım seçeneklerini teşvik ederek trafik etkilerini azaltabilir.</a:t>
+            </a:r>
+          </a:p>
+          <a:p>
+            <a:pPr marL="285750" indent="-285750" algn="l">
+              <a:buFont typeface="Arial" panose="020B0604020202020204" pitchFamily="34" charset="0"/>
+              <a:buChar char="•"/>
+            </a:pPr>
+            <a:r>
+              <a:rPr lang="tr-TR" b="0" i="0" dirty="0">
+                <a:solidFill>
+                  <a:srgbClr val="374151"/>
+                </a:solidFill>
+                <a:effectLst/>
+                <a:latin typeface="Söhne"/>
+              </a:rPr>
+              <a:t>İklim değişikliği, trafik koşullarını da etkileyebilir ve yolların bakımını etkileyebilir.</a:t>
+            </a:r>
+          </a:p>
+        </p:txBody>
+      </p:sp>
+    </p:spTree>
+    <p:extLst>
+      <p:ext uri="{BB962C8B-B14F-4D97-AF65-F5344CB8AC3E}">
+        <p14:creationId xmlns:p14="http://schemas.microsoft.com/office/powerpoint/2010/main" val="965344665"/>
+      </p:ext>
+    </p:extLst>
+  </p:cSld>
+  <p:clrMapOvr>
+    <a:masterClrMapping/>
+  </p:clrMapOvr>
+</p:sld>
+</file>
+
+<file path=ppt/slides/slide25.xml><?xml version="1.0" encoding="utf-8"?>
+<p:sld xmlns:a="http://schemas.openxmlformats.org/drawingml/2006/main" xmlns:r="http://schemas.openxmlformats.org/officeDocument/2006/relationships" xmlns:p="http://schemas.openxmlformats.org/presentationml/2006/main">
+  <p:cSld>
+    <p:bg>
+      <p:bgPr>
+        <a:solidFill>
+          <a:schemeClr val="bg1"/>
+        </a:solidFill>
+        <a:effectLst/>
+      </p:bgPr>
+    </p:bg>
+    <p:spTree>
+      <p:nvGrpSpPr>
+        <p:cNvPr id="1" name=""/>
+        <p:cNvGrpSpPr/>
+        <p:nvPr/>
+      </p:nvGrpSpPr>
+      <p:grpSpPr>
+        <a:xfrm>
+          <a:off x="0" y="0"/>
+          <a:ext cx="0" cy="0"/>
+          <a:chOff x="0" y="0"/>
+          <a:chExt cx="0" cy="0"/>
+        </a:xfrm>
+      </p:grpSpPr>
+      <p:pic>
+        <p:nvPicPr>
+          <p:cNvPr id="13" name="Resim 12" descr="diyagram, daire, ekran görüntüsü, tasarım içeren bir resim&#10;&#10;Açıklama otomatik olarak oluşturuldu">
+            <a:extLst>
+              <a:ext uri="{FF2B5EF4-FFF2-40B4-BE49-F238E27FC236}">
+                <a16:creationId xmlns:a16="http://schemas.microsoft.com/office/drawing/2014/main" id="{D028B905-D3B5-CF46-3ACC-6993F42DF1D4}"/>
+              </a:ext>
+            </a:extLst>
+          </p:cNvPr>
+          <p:cNvPicPr>
+            <a:picLocks noChangeAspect="1"/>
+          </p:cNvPicPr>
+          <p:nvPr/>
+        </p:nvPicPr>
+        <p:blipFill>
+          <a:blip r:embed="rId2">
+            <a:extLst>
+              <a:ext uri="{28A0092B-C50C-407E-A947-70E740481C1C}">
+                <a14:useLocalDpi xmlns:a14="http://schemas.microsoft.com/office/drawing/2010/main" val="0"/>
+              </a:ext>
+            </a:extLst>
+          </a:blip>
+          <a:stretch>
+            <a:fillRect/>
+          </a:stretch>
+        </p:blipFill>
+        <p:spPr>
+          <a:xfrm>
+            <a:off x="2225870" y="3403693"/>
+            <a:ext cx="2543217" cy="2543217"/>
+          </a:xfrm>
+          <a:prstGeom prst="rect">
+            <a:avLst/>
+          </a:prstGeom>
+        </p:spPr>
+      </p:pic>
+      <p:cxnSp>
+        <p:nvCxnSpPr>
+          <p:cNvPr id="60" name="Straight Connector 59">
+            <a:extLst>
+              <a:ext uri="{FF2B5EF4-FFF2-40B4-BE49-F238E27FC236}">
+                <a16:creationId xmlns:a16="http://schemas.microsoft.com/office/drawing/2014/main" id="{91B6081D-D3E8-4209-B85B-EB1C655A6272}"/>
+              </a:ext>
+              <a:ext uri="{C183D7F6-B498-43B3-948B-1728B52AA6E4}">
+                <adec:decorative xmlns:adec="http://schemas.microsoft.com/office/drawing/2017/decorative" val="1"/>
+              </a:ext>
+            </a:extLst>
+          </p:cNvPr>
+          <p:cNvCxnSpPr>
+            <a:cxnSpLocks noGrp="1" noRot="1" noChangeAspect="1" noMove="1" noResize="1" noEditPoints="1" noAdjustHandles="1" noChangeArrowheads="1" noChangeShapeType="1"/>
+          </p:cNvCxnSpPr>
+          <p:nvPr>
+            <p:extLst>
+              <p:ext uri="{386F3935-93C4-4BCD-93E2-E3B085C9AB24}">
+                <p16:designElem xmlns:p16="http://schemas.microsoft.com/office/powerpoint/2015/main" val="1"/>
+              </p:ext>
+            </p:extLst>
+          </p:nvPr>
+        </p:nvCxnSpPr>
+        <p:spPr>
+          <a:xfrm>
+            <a:off x="6091214" y="1111170"/>
+            <a:ext cx="11040" cy="4645103"/>
+          </a:xfrm>
+          <a:prstGeom prst="line">
+            <a:avLst/>
+          </a:prstGeom>
+          <a:ln w="19050">
+            <a:solidFill>
+              <a:srgbClr val="7F7F7F"/>
+            </a:solidFill>
+          </a:ln>
+        </p:spPr>
+        <p:style>
+          <a:lnRef idx="1">
+            <a:schemeClr val="accent1"/>
+          </a:lnRef>
+          <a:fillRef idx="0">
+            <a:schemeClr val="accent1"/>
+          </a:fillRef>
+          <a:effectRef idx="0">
+            <a:schemeClr val="accent1"/>
+          </a:effectRef>
+          <a:fontRef idx="minor">
+            <a:schemeClr val="tx1"/>
+          </a:fontRef>
+        </p:style>
+      </p:cxnSp>
+      <p:pic>
+        <p:nvPicPr>
+          <p:cNvPr id="15" name="Resim 14" descr="diyagram, daire, ekran görüntüsü, tasarım içeren bir resim&#10;&#10;Açıklama otomatik olarak oluşturuldu">
+            <a:extLst>
+              <a:ext uri="{FF2B5EF4-FFF2-40B4-BE49-F238E27FC236}">
+                <a16:creationId xmlns:a16="http://schemas.microsoft.com/office/drawing/2014/main" id="{0D58B7FE-8894-6436-B876-BA69CEDABD8A}"/>
+              </a:ext>
+            </a:extLst>
+          </p:cNvPr>
+          <p:cNvPicPr>
+            <a:picLocks noChangeAspect="1"/>
+          </p:cNvPicPr>
+          <p:nvPr/>
+        </p:nvPicPr>
+        <p:blipFill>
+          <a:blip r:embed="rId3">
+            <a:extLst>
+              <a:ext uri="{28A0092B-C50C-407E-A947-70E740481C1C}">
+                <a14:useLocalDpi xmlns:a14="http://schemas.microsoft.com/office/drawing/2010/main" val="0"/>
+              </a:ext>
+            </a:extLst>
+          </a:blip>
+          <a:stretch>
+            <a:fillRect/>
+          </a:stretch>
+        </p:blipFill>
+        <p:spPr>
+          <a:xfrm>
+            <a:off x="7433177" y="3395159"/>
+            <a:ext cx="2543217" cy="2543217"/>
+          </a:xfrm>
+          <a:prstGeom prst="rect">
+            <a:avLst/>
+          </a:prstGeom>
+        </p:spPr>
+      </p:pic>
+      <p:cxnSp>
+        <p:nvCxnSpPr>
+          <p:cNvPr id="62" name="Straight Connector 61">
+            <a:extLst>
+              <a:ext uri="{FF2B5EF4-FFF2-40B4-BE49-F238E27FC236}">
+                <a16:creationId xmlns:a16="http://schemas.microsoft.com/office/drawing/2014/main" id="{28CA55E4-1295-45C8-BA05-5A9E705B749A}"/>
+              </a:ext>
+              <a:ext uri="{C183D7F6-B498-43B3-948B-1728B52AA6E4}">
+                <adec:decorative xmlns:adec="http://schemas.microsoft.com/office/drawing/2017/decorative" val="1"/>
+              </a:ext>
+            </a:extLst>
+          </p:cNvPr>
+          <p:cNvCxnSpPr>
+            <a:cxnSpLocks noGrp="1" noRot="1" noChangeAspect="1" noMove="1" noResize="1" noEditPoints="1" noAdjustHandles="1" noChangeArrowheads="1" noChangeShapeType="1"/>
+          </p:cNvCxnSpPr>
+          <p:nvPr>
+            <p:extLst>
+              <p:ext uri="{386F3935-93C4-4BCD-93E2-E3B085C9AB24}">
+                <p16:designElem xmlns:p16="http://schemas.microsoft.com/office/powerpoint/2015/main" val="1"/>
+              </p:ext>
+            </p:extLst>
+          </p:nvPr>
+        </p:nvCxnSpPr>
+        <p:spPr>
+          <a:xfrm>
+            <a:off x="1403027" y="3428998"/>
+            <a:ext cx="4188904" cy="1"/>
+          </a:xfrm>
+          <a:prstGeom prst="line">
+            <a:avLst/>
+          </a:prstGeom>
+          <a:ln w="19050">
+            <a:solidFill>
+              <a:srgbClr val="7F7F7F"/>
+            </a:solidFill>
+          </a:ln>
+        </p:spPr>
+        <p:style>
+          <a:lnRef idx="1">
+            <a:schemeClr val="accent1"/>
+          </a:lnRef>
+          <a:fillRef idx="0">
+            <a:schemeClr val="accent1"/>
+          </a:fillRef>
+          <a:effectRef idx="0">
+            <a:schemeClr val="accent1"/>
+          </a:effectRef>
+          <a:fontRef idx="minor">
+            <a:schemeClr val="tx1"/>
+          </a:fontRef>
+        </p:style>
+      </p:cxnSp>
+      <p:cxnSp>
+        <p:nvCxnSpPr>
+          <p:cNvPr id="64" name="Straight Connector 63">
+            <a:extLst>
+              <a:ext uri="{FF2B5EF4-FFF2-40B4-BE49-F238E27FC236}">
+                <a16:creationId xmlns:a16="http://schemas.microsoft.com/office/drawing/2014/main" id="{08C5794E-A9A1-4A23-AF68-C79A7822334C}"/>
+              </a:ext>
+              <a:ext uri="{C183D7F6-B498-43B3-948B-1728B52AA6E4}">
+                <adec:decorative xmlns:adec="http://schemas.microsoft.com/office/drawing/2017/decorative" val="1"/>
+              </a:ext>
+            </a:extLst>
+          </p:cNvPr>
+          <p:cNvCxnSpPr>
+            <a:cxnSpLocks noGrp="1" noRot="1" noChangeAspect="1" noMove="1" noResize="1" noEditPoints="1" noAdjustHandles="1" noChangeArrowheads="1" noChangeShapeType="1"/>
+          </p:cNvCxnSpPr>
+          <p:nvPr>
+            <p:extLst>
+              <p:ext uri="{386F3935-93C4-4BCD-93E2-E3B085C9AB24}">
+                <p16:designElem xmlns:p16="http://schemas.microsoft.com/office/powerpoint/2015/main" val="1"/>
+              </p:ext>
+            </p:extLst>
+          </p:nvPr>
+        </p:nvCxnSpPr>
+        <p:spPr>
+          <a:xfrm>
+            <a:off x="6610334" y="3428998"/>
+            <a:ext cx="4188904" cy="1"/>
+          </a:xfrm>
+          <a:prstGeom prst="line">
+            <a:avLst/>
+          </a:prstGeom>
+          <a:ln w="19050">
+            <a:solidFill>
+              <a:srgbClr val="7F7F7F"/>
+            </a:solidFill>
+          </a:ln>
+        </p:spPr>
+        <p:style>
+          <a:lnRef idx="1">
+            <a:schemeClr val="accent1"/>
+          </a:lnRef>
+          <a:fillRef idx="0">
+            <a:schemeClr val="accent1"/>
+          </a:fillRef>
+          <a:effectRef idx="0">
+            <a:schemeClr val="accent1"/>
+          </a:effectRef>
+          <a:fontRef idx="minor">
+            <a:schemeClr val="tx1"/>
+          </a:fontRef>
+        </p:style>
+      </p:cxnSp>
+      <p:pic>
+        <p:nvPicPr>
+          <p:cNvPr id="22" name="Resim 21" descr="diyagram, ekran görüntüsü, daire, tasarım içeren bir resim&#10;&#10;Açıklama otomatik olarak oluşturuldu">
+            <a:extLst>
+              <a:ext uri="{FF2B5EF4-FFF2-40B4-BE49-F238E27FC236}">
+                <a16:creationId xmlns:a16="http://schemas.microsoft.com/office/drawing/2014/main" id="{17C57AE0-2ADA-F448-81FC-723695193E20}"/>
+              </a:ext>
+            </a:extLst>
+          </p:cNvPr>
+          <p:cNvPicPr>
+            <a:picLocks noChangeAspect="1"/>
+          </p:cNvPicPr>
+          <p:nvPr/>
+        </p:nvPicPr>
+        <p:blipFill>
+          <a:blip r:embed="rId4">
+            <a:extLst>
+              <a:ext uri="{28A0092B-C50C-407E-A947-70E740481C1C}">
+                <a14:useLocalDpi xmlns:a14="http://schemas.microsoft.com/office/drawing/2010/main" val="0"/>
+              </a:ext>
+            </a:extLst>
+          </a:blip>
+          <a:stretch>
+            <a:fillRect/>
+          </a:stretch>
+        </p:blipFill>
+        <p:spPr>
+          <a:xfrm>
+            <a:off x="7433177" y="716856"/>
+            <a:ext cx="2545862" cy="2545862"/>
+          </a:xfrm>
+          <a:prstGeom prst="rect">
+            <a:avLst/>
+          </a:prstGeom>
+        </p:spPr>
+      </p:pic>
+      <p:pic>
+        <p:nvPicPr>
+          <p:cNvPr id="19" name="Resim 18" descr="ekran görüntüsü, diyagram, daire, tasarım içeren bir resim&#10;&#10;Açıklama otomatik olarak oluşturuldu">
+            <a:extLst>
+              <a:ext uri="{FF2B5EF4-FFF2-40B4-BE49-F238E27FC236}">
+                <a16:creationId xmlns:a16="http://schemas.microsoft.com/office/drawing/2014/main" id="{D2BC3170-4C2E-7781-2F6B-874DE6E1226D}"/>
+              </a:ext>
+            </a:extLst>
+          </p:cNvPr>
+          <p:cNvPicPr>
+            <a:picLocks noChangeAspect="1"/>
+          </p:cNvPicPr>
+          <p:nvPr/>
+        </p:nvPicPr>
+        <p:blipFill>
+          <a:blip r:embed="rId5">
+            <a:extLst>
+              <a:ext uri="{28A0092B-C50C-407E-A947-70E740481C1C}">
+                <a14:useLocalDpi xmlns:a14="http://schemas.microsoft.com/office/drawing/2010/main" val="0"/>
+              </a:ext>
+            </a:extLst>
+          </a:blip>
+          <a:stretch>
+            <a:fillRect/>
+          </a:stretch>
+        </p:blipFill>
+        <p:spPr>
+          <a:xfrm>
+            <a:off x="2225870" y="669497"/>
+            <a:ext cx="2553469" cy="2553469"/>
+          </a:xfrm>
+          <a:prstGeom prst="rect">
+            <a:avLst/>
+          </a:prstGeom>
+        </p:spPr>
+      </p:pic>
+    </p:spTree>
+    <p:extLst>
+      <p:ext uri="{BB962C8B-B14F-4D97-AF65-F5344CB8AC3E}">
+        <p14:creationId xmlns:p14="http://schemas.microsoft.com/office/powerpoint/2010/main" val="3321125904"/>
+      </p:ext>
+    </p:extLst>
+  </p:cSld>
+  <p:clrMapOvr>
+    <a:masterClrMapping/>
+  </p:clrMapOvr>
+</p:sld>
+</file>
+
+<file path=ppt/slides/slide26.xml><?xml version="1.0" encoding="utf-8"?>
+<p:sld xmlns:a="http://schemas.openxmlformats.org/drawingml/2006/main" xmlns:r="http://schemas.openxmlformats.org/officeDocument/2006/relationships" xmlns:p="http://schemas.openxmlformats.org/presentationml/2006/main">
+  <p:cSld>
+    <p:spTree>
+      <p:nvGrpSpPr>
+        <p:cNvPr id="1" name=""/>
+        <p:cNvGrpSpPr/>
+        <p:nvPr/>
+      </p:nvGrpSpPr>
+      <p:grpSpPr>
+        <a:xfrm>
+          <a:off x="0" y="0"/>
+          <a:ext cx="0" cy="0"/>
+          <a:chOff x="0" y="0"/>
+          <a:chExt cx="0" cy="0"/>
+        </a:xfrm>
+      </p:grpSpPr>
+      <p:pic>
+        <p:nvPicPr>
+          <p:cNvPr id="3" name="Resim 2" descr="metin, çizgi, öykü gelişim çizgisi; kumpas; grafiğini çıkarma, diyagram içeren bir resim&#10;&#10;Açıklama otomatik olarak oluşturuldu">
+            <a:extLst>
+              <a:ext uri="{FF2B5EF4-FFF2-40B4-BE49-F238E27FC236}">
+                <a16:creationId xmlns:a16="http://schemas.microsoft.com/office/drawing/2014/main" id="{D82918F7-0E0A-3AA5-706A-CB77479DC918}"/>
+              </a:ext>
+            </a:extLst>
+          </p:cNvPr>
+          <p:cNvPicPr>
+            <a:picLocks noChangeAspect="1"/>
+          </p:cNvPicPr>
+          <p:nvPr/>
+        </p:nvPicPr>
+        <p:blipFill>
+          <a:blip r:embed="rId2">
+            <a:extLst>
+              <a:ext uri="{28A0092B-C50C-407E-A947-70E740481C1C}">
+                <a14:useLocalDpi xmlns:a14="http://schemas.microsoft.com/office/drawing/2010/main" val="0"/>
+              </a:ext>
+            </a:extLst>
+          </a:blip>
+          <a:stretch>
+            <a:fillRect/>
+          </a:stretch>
+        </p:blipFill>
+        <p:spPr>
+          <a:xfrm>
+            <a:off x="0" y="990600"/>
+            <a:ext cx="12192000" cy="4876800"/>
+          </a:xfrm>
+          <a:prstGeom prst="rect">
+            <a:avLst/>
+          </a:prstGeom>
+        </p:spPr>
+      </p:pic>
+    </p:spTree>
+    <p:extLst>
+      <p:ext uri="{BB962C8B-B14F-4D97-AF65-F5344CB8AC3E}">
+        <p14:creationId xmlns:p14="http://schemas.microsoft.com/office/powerpoint/2010/main" val="3573284028"/>
+      </p:ext>
+    </p:extLst>
+  </p:cSld>
+  <p:clrMapOvr>
+    <a:masterClrMapping/>
+  </p:clrMapOvr>
+</p:sld>
+</file>
+
+<file path=ppt/slides/slide27.xml><?xml version="1.0" encoding="utf-8"?>
+<p:sld xmlns:a="http://schemas.openxmlformats.org/drawingml/2006/main" xmlns:r="http://schemas.openxmlformats.org/officeDocument/2006/relationships" xmlns:p="http://schemas.openxmlformats.org/presentationml/2006/main">
+  <p:cSld>
+    <p:spTree>
+      <p:nvGrpSpPr>
+        <p:cNvPr id="1" name=""/>
+        <p:cNvGrpSpPr/>
+        <p:nvPr/>
+      </p:nvGrpSpPr>
+      <p:grpSpPr>
+        <a:xfrm>
+          <a:off x="0" y="0"/>
+          <a:ext cx="0" cy="0"/>
+          <a:chOff x="0" y="0"/>
+          <a:chExt cx="0" cy="0"/>
+        </a:xfrm>
+      </p:grpSpPr>
+      <p:pic>
+        <p:nvPicPr>
+          <p:cNvPr id="5" name="Resim 4" descr="metin, çizgi, öykü gelişim çizgisi; kumpas; grafiğini çıkarma, diyagram içeren bir resim&#10;&#10;Açıklama otomatik olarak oluşturuldu">
+            <a:extLst>
+              <a:ext uri="{FF2B5EF4-FFF2-40B4-BE49-F238E27FC236}">
+                <a16:creationId xmlns:a16="http://schemas.microsoft.com/office/drawing/2014/main" id="{048F1F02-1DD0-0263-BA4D-708D7C5C8AAA}"/>
+              </a:ext>
+            </a:extLst>
+          </p:cNvPr>
+          <p:cNvPicPr>
+            <a:picLocks noChangeAspect="1"/>
+          </p:cNvPicPr>
+          <p:nvPr/>
+        </p:nvPicPr>
+        <p:blipFill>
+          <a:blip r:embed="rId2">
+            <a:extLst>
+              <a:ext uri="{28A0092B-C50C-407E-A947-70E740481C1C}">
+                <a14:useLocalDpi xmlns:a14="http://schemas.microsoft.com/office/drawing/2010/main" val="0"/>
+              </a:ext>
+            </a:extLst>
+          </a:blip>
+          <a:stretch>
+            <a:fillRect/>
+          </a:stretch>
+        </p:blipFill>
+        <p:spPr>
+          <a:xfrm>
+            <a:off x="0" y="990600"/>
+            <a:ext cx="12192000" cy="4876800"/>
+          </a:xfrm>
+          <a:prstGeom prst="rect">
+            <a:avLst/>
+          </a:prstGeom>
+        </p:spPr>
+      </p:pic>
+    </p:spTree>
+    <p:extLst>
+      <p:ext uri="{BB962C8B-B14F-4D97-AF65-F5344CB8AC3E}">
+        <p14:creationId xmlns:p14="http://schemas.microsoft.com/office/powerpoint/2010/main" val="3283450581"/>
+      </p:ext>
+    </p:extLst>
+  </p:cSld>
+  <p:clrMapOvr>
+    <a:masterClrMapping/>
+  </p:clrMapOvr>
+</p:sld>
+</file>
+
+<file path=ppt/slides/slide28.xml><?xml version="1.0" encoding="utf-8"?>
+<p:sld xmlns:a="http://schemas.openxmlformats.org/drawingml/2006/main" xmlns:r="http://schemas.openxmlformats.org/officeDocument/2006/relationships" xmlns:p="http://schemas.openxmlformats.org/presentationml/2006/main">
+  <p:cSld>
+    <p:spTree>
+      <p:nvGrpSpPr>
+        <p:cNvPr id="1" name=""/>
+        <p:cNvGrpSpPr/>
+        <p:nvPr/>
+      </p:nvGrpSpPr>
+      <p:grpSpPr>
+        <a:xfrm>
+          <a:off x="0" y="0"/>
+          <a:ext cx="0" cy="0"/>
+          <a:chOff x="0" y="0"/>
+          <a:chExt cx="0" cy="0"/>
+        </a:xfrm>
+      </p:grpSpPr>
+      <p:sp>
+        <p:nvSpPr>
+          <p:cNvPr id="2" name="Başlık 1">
+            <a:extLst>
+              <a:ext uri="{FF2B5EF4-FFF2-40B4-BE49-F238E27FC236}">
+                <a16:creationId xmlns:a16="http://schemas.microsoft.com/office/drawing/2014/main" id="{3ACC7431-E00D-5006-99E3-4122781B374F}"/>
+              </a:ext>
+            </a:extLst>
+          </p:cNvPr>
+          <p:cNvSpPr>
+            <a:spLocks noGrp="1"/>
+          </p:cNvSpPr>
+          <p:nvPr>
+            <p:ph type="ctrTitle"/>
+          </p:nvPr>
+        </p:nvSpPr>
+        <p:spPr>
+          <a:xfrm>
+            <a:off x="1441751" y="1436931"/>
+            <a:ext cx="8784599" cy="765111"/>
+          </a:xfrm>
+        </p:spPr>
+        <p:txBody>
+          <a:bodyPr/>
+          <a:lstStyle/>
+          <a:p>
+            <a:pPr algn="l"/>
+            <a:r>
+              <a:rPr lang="tr-TR" sz="4400" dirty="0"/>
+              <a:t>Tahminleme Modeli</a:t>
+            </a:r>
+          </a:p>
+        </p:txBody>
+      </p:sp>
+      <p:sp>
+        <p:nvSpPr>
+          <p:cNvPr id="3" name="Metin kutusu 2">
+            <a:extLst>
+              <a:ext uri="{FF2B5EF4-FFF2-40B4-BE49-F238E27FC236}">
+                <a16:creationId xmlns:a16="http://schemas.microsoft.com/office/drawing/2014/main" id="{57371B57-E141-CF01-DA62-9CAFA7D89C62}"/>
+              </a:ext>
+            </a:extLst>
+          </p:cNvPr>
+          <p:cNvSpPr txBox="1"/>
+          <p:nvPr/>
+        </p:nvSpPr>
+        <p:spPr>
+          <a:xfrm>
+            <a:off x="1441752" y="2480608"/>
+            <a:ext cx="7766936" cy="1477328"/>
+          </a:xfrm>
+          <a:prstGeom prst="rect">
+            <a:avLst/>
+          </a:prstGeom>
+          <a:noFill/>
+        </p:spPr>
+        <p:txBody>
+          <a:bodyPr wrap="square" rtlCol="0">
+            <a:spAutoFit/>
+          </a:bodyPr>
+          <a:lstStyle/>
+          <a:p>
+            <a:pPr marL="285750" indent="-285750" algn="l">
+              <a:buFont typeface="Arial" panose="020B0604020202020204" pitchFamily="34" charset="0"/>
+              <a:buChar char="•"/>
+            </a:pPr>
+            <a:r>
+              <a:rPr lang="tr-TR" b="0" i="0" dirty="0">
+                <a:solidFill>
+                  <a:srgbClr val="374151"/>
+                </a:solidFill>
+                <a:effectLst/>
+                <a:latin typeface="Söhne"/>
+              </a:rPr>
+              <a:t>SK-</a:t>
+            </a:r>
+            <a:r>
+              <a:rPr lang="tr-TR" b="0" i="0" dirty="0" err="1">
+                <a:solidFill>
+                  <a:srgbClr val="374151"/>
+                </a:solidFill>
+                <a:effectLst/>
+                <a:latin typeface="Söhne"/>
+              </a:rPr>
+              <a:t>Learn</a:t>
+            </a:r>
+            <a:r>
+              <a:rPr lang="tr-TR" b="0" i="0" dirty="0">
+                <a:solidFill>
+                  <a:srgbClr val="374151"/>
+                </a:solidFill>
+                <a:effectLst/>
+                <a:latin typeface="Söhne"/>
+              </a:rPr>
+              <a:t> ve Lineer Regresyon modellemesi kullanıldı.</a:t>
+            </a:r>
+          </a:p>
+          <a:p>
+            <a:pPr marL="285750" indent="-285750" algn="l">
+              <a:buFont typeface="Arial" panose="020B0604020202020204" pitchFamily="34" charset="0"/>
+              <a:buChar char="•"/>
+            </a:pPr>
+            <a:r>
+              <a:rPr lang="tr-TR" dirty="0">
+                <a:solidFill>
+                  <a:srgbClr val="374151"/>
+                </a:solidFill>
+                <a:latin typeface="Söhne"/>
+              </a:rPr>
+              <a:t>Zincir tahmin sistemi oluşturuldu.</a:t>
+            </a:r>
+          </a:p>
+          <a:p>
+            <a:pPr marL="285750" indent="-285750" algn="l">
+              <a:buFont typeface="Arial" panose="020B0604020202020204" pitchFamily="34" charset="0"/>
+              <a:buChar char="•"/>
+            </a:pPr>
+            <a:r>
+              <a:rPr lang="tr-TR" dirty="0">
+                <a:solidFill>
+                  <a:srgbClr val="374151"/>
+                </a:solidFill>
+                <a:latin typeface="Söhne"/>
+              </a:rPr>
+              <a:t>Emisyon ve Sıcaklık tahminleri oluşturuldu.</a:t>
+            </a:r>
+          </a:p>
+          <a:p>
+            <a:pPr marL="285750" indent="-285750" algn="l">
+              <a:buFont typeface="Arial" panose="020B0604020202020204" pitchFamily="34" charset="0"/>
+              <a:buChar char="•"/>
+            </a:pPr>
+            <a:r>
+              <a:rPr lang="tr-TR" b="0" i="0" dirty="0" err="1">
+                <a:solidFill>
+                  <a:srgbClr val="374151"/>
+                </a:solidFill>
+                <a:effectLst/>
+                <a:latin typeface="Söhne"/>
+              </a:rPr>
+              <a:t>TensorFlow</a:t>
+            </a:r>
+            <a:r>
+              <a:rPr lang="tr-TR" b="0" i="0" dirty="0">
+                <a:solidFill>
+                  <a:srgbClr val="374151"/>
+                </a:solidFill>
+                <a:effectLst/>
+                <a:latin typeface="Söhne"/>
+              </a:rPr>
+              <a:t> ve </a:t>
+            </a:r>
+            <a:r>
+              <a:rPr lang="tr-TR" b="0" i="0" dirty="0" err="1">
+                <a:solidFill>
+                  <a:srgbClr val="374151"/>
+                </a:solidFill>
+                <a:effectLst/>
+                <a:latin typeface="Söhne"/>
+              </a:rPr>
+              <a:t>Spark</a:t>
+            </a:r>
+            <a:r>
+              <a:rPr lang="tr-TR" b="0" i="0" dirty="0">
+                <a:solidFill>
+                  <a:srgbClr val="374151"/>
+                </a:solidFill>
+                <a:effectLst/>
+                <a:latin typeface="Söhne"/>
+              </a:rPr>
+              <a:t> tahminlemeleri eklentileri yapılacak.</a:t>
+            </a:r>
+          </a:p>
+          <a:p>
+            <a:pPr marL="285750" indent="-285750" algn="l">
+              <a:buFont typeface="Arial" panose="020B0604020202020204" pitchFamily="34" charset="0"/>
+              <a:buChar char="•"/>
+            </a:pPr>
+            <a:r>
+              <a:rPr lang="tr-TR" dirty="0">
+                <a:solidFill>
+                  <a:srgbClr val="374151"/>
+                </a:solidFill>
+                <a:latin typeface="Söhne"/>
+              </a:rPr>
+              <a:t>Popülasyon, trafik kullanımı oranı tahminlemeleri yapılacak.</a:t>
+            </a:r>
+            <a:endParaRPr lang="tr-TR" b="0" i="0" dirty="0">
+              <a:solidFill>
+                <a:srgbClr val="374151"/>
+              </a:solidFill>
+              <a:effectLst/>
+              <a:latin typeface="Söhne"/>
+            </a:endParaRPr>
+          </a:p>
+        </p:txBody>
+      </p:sp>
+    </p:spTree>
+    <p:extLst>
+      <p:ext uri="{BB962C8B-B14F-4D97-AF65-F5344CB8AC3E}">
+        <p14:creationId xmlns:p14="http://schemas.microsoft.com/office/powerpoint/2010/main" val="764749892"/>
+      </p:ext>
+    </p:extLst>
+  </p:cSld>
+  <p:clrMapOvr>
+    <a:masterClrMapping/>
+  </p:clrMapOvr>
+</p:sld>
+</file>
+
+<file path=ppt/slides/slide29.xml><?xml version="1.0" encoding="utf-8"?>
+<p:sld xmlns:a="http://schemas.openxmlformats.org/drawingml/2006/main" xmlns:r="http://schemas.openxmlformats.org/officeDocument/2006/relationships" xmlns:p="http://schemas.openxmlformats.org/presentationml/2006/main">
+  <p:cSld>
+    <p:spTree>
+      <p:nvGrpSpPr>
+        <p:cNvPr id="1" name=""/>
+        <p:cNvGrpSpPr/>
+        <p:nvPr/>
+      </p:nvGrpSpPr>
+      <p:grpSpPr>
+        <a:xfrm>
+          <a:off x="0" y="0"/>
+          <a:ext cx="0" cy="0"/>
+          <a:chOff x="0" y="0"/>
+          <a:chExt cx="0" cy="0"/>
+        </a:xfrm>
+      </p:grpSpPr>
+      <p:pic>
+        <p:nvPicPr>
+          <p:cNvPr id="5" name="Resim 4" descr="metin, ekran görüntüsü, öykü gelişim çizgisi; kumpas; grafiğini çıkarma, diyagram içeren bir resim&#10;&#10;Açıklama otomatik olarak oluşturuldu">
+            <a:extLst>
+              <a:ext uri="{FF2B5EF4-FFF2-40B4-BE49-F238E27FC236}">
+                <a16:creationId xmlns:a16="http://schemas.microsoft.com/office/drawing/2014/main" id="{8435AFEB-FFBE-D6F8-7DBD-B647074AE644}"/>
+              </a:ext>
+            </a:extLst>
+          </p:cNvPr>
+          <p:cNvPicPr>
+            <a:picLocks noChangeAspect="1"/>
+          </p:cNvPicPr>
+          <p:nvPr/>
+        </p:nvPicPr>
+        <p:blipFill>
+          <a:blip r:embed="rId2">
+            <a:extLst>
+              <a:ext uri="{28A0092B-C50C-407E-A947-70E740481C1C}">
+                <a14:useLocalDpi xmlns:a14="http://schemas.microsoft.com/office/drawing/2010/main" val="0"/>
+              </a:ext>
+            </a:extLst>
+          </a:blip>
+          <a:stretch>
+            <a:fillRect/>
+          </a:stretch>
+        </p:blipFill>
+        <p:spPr>
+          <a:xfrm>
+            <a:off x="380999" y="0"/>
+            <a:ext cx="11430000" cy="6858000"/>
+          </a:xfrm>
+          <a:prstGeom prst="rect">
+            <a:avLst/>
+          </a:prstGeom>
+        </p:spPr>
+      </p:pic>
+    </p:spTree>
+    <p:extLst>
+      <p:ext uri="{BB962C8B-B14F-4D97-AF65-F5344CB8AC3E}">
+        <p14:creationId xmlns:p14="http://schemas.microsoft.com/office/powerpoint/2010/main" val="3154245196"/>
       </p:ext>
     </p:extLst>
   </p:cSld>
@@ -7121,10 +8219,10 @@
       </p:grpSpPr>
       <p:sp>
         <p:nvSpPr>
-          <p:cNvPr id="2" name="Başlık 1">
+          <p:cNvPr id="3" name="İçerik Yer Tutucusu 2">
             <a:extLst>
               <a:ext uri="{FF2B5EF4-FFF2-40B4-BE49-F238E27FC236}">
-                <a16:creationId xmlns:a16="http://schemas.microsoft.com/office/drawing/2014/main" id="{7533D3D1-3747-C0E6-7893-324C4255DDDF}"/>
+                <a16:creationId xmlns:a16="http://schemas.microsoft.com/office/drawing/2014/main" id="{84298D4D-727B-245A-72CF-E65521D732C2}"/>
               </a:ext>
             </a:extLst>
           </p:cNvPr>
@@ -7132,58 +8230,92 @@
             <a:spLocks noGrp="1"/>
           </p:cNvSpPr>
           <p:nvPr>
-            <p:ph type="title"/>
-          </p:nvPr>
-        </p:nvSpPr>
-        <p:spPr/>
-        <p:txBody>
-          <a:bodyPr>
-            <a:normAutofit/>
-          </a:bodyPr>
-          <a:lstStyle/>
-          <a:p>
-            <a:r>
-              <a:rPr lang="tr-TR" dirty="0"/>
-              <a:t>Veri Kaynakları</a:t>
-            </a:r>
-            <a:br>
-              <a:rPr lang="tr-TR" dirty="0"/>
-            </a:br>
-            <a:r>
-              <a:rPr lang="tr-TR" sz="1800" b="1" i="1" dirty="0"/>
-              <a:t>-İklim Verileri</a:t>
-            </a:r>
-          </a:p>
-        </p:txBody>
-      </p:sp>
-      <p:sp>
-        <p:nvSpPr>
-          <p:cNvPr id="3" name="İçerik Yer Tutucusu 2">
-            <a:extLst>
-              <a:ext uri="{FF2B5EF4-FFF2-40B4-BE49-F238E27FC236}">
-                <a16:creationId xmlns:a16="http://schemas.microsoft.com/office/drawing/2014/main" id="{9440007B-0DD1-F5F7-9A36-A12964D7C04A}"/>
-              </a:ext>
-            </a:extLst>
-          </p:cNvPr>
-          <p:cNvSpPr>
-            <a:spLocks noGrp="1"/>
-          </p:cNvSpPr>
-          <p:nvPr>
             <p:ph idx="1"/>
           </p:nvPr>
         </p:nvSpPr>
-        <p:spPr/>
+        <p:spPr>
+          <a:xfrm>
+            <a:off x="596652" y="1488613"/>
+            <a:ext cx="8596668" cy="3880773"/>
+          </a:xfrm>
+        </p:spPr>
         <p:txBody>
           <a:bodyPr/>
           <a:lstStyle/>
           <a:p>
             <a:r>
               <a:rPr lang="tr-TR" dirty="0"/>
-              <a:t>Veriler </a:t>
+              <a:t>Elde edilen verilerdeki önemli noktalar bir araya getirilerek tahminleme modellerinde kullanılmak üzere düzenlenmiştir.</a:t>
+            </a:r>
+          </a:p>
+          <a:p>
+            <a:r>
+              <a:rPr lang="tr-TR" dirty="0"/>
+              <a:t>Düzenleme işlemleri </a:t>
             </a:r>
             <a:r>
               <a:rPr lang="tr-TR" dirty="0" err="1"/>
-              <a:t>Meteostat</a:t>
+              <a:t>Pandas</a:t>
+            </a:r>
+            <a:r>
+              <a:rPr lang="tr-TR" dirty="0"/>
+              <a:t> kullanılarak gerçekleştirilmiştir.</a:t>
+            </a:r>
+          </a:p>
+          <a:p>
+            <a:r>
+              <a:rPr lang="tr-TR" dirty="0"/>
+              <a:t>Tahminleme modelleri SK-</a:t>
+            </a:r>
+            <a:r>
+              <a:rPr lang="tr-TR" dirty="0" err="1"/>
+              <a:t>Learn</a:t>
+            </a:r>
+            <a:r>
+              <a:rPr lang="tr-TR" dirty="0"/>
+              <a:t>, </a:t>
+            </a:r>
+            <a:r>
+              <a:rPr lang="tr-TR" dirty="0" err="1"/>
+              <a:t>TensorFlow</a:t>
+            </a:r>
+            <a:r>
+              <a:rPr lang="tr-TR" dirty="0"/>
+              <a:t> ve </a:t>
+            </a:r>
+            <a:r>
+              <a:rPr lang="tr-TR" dirty="0" err="1"/>
+              <a:t>Spark</a:t>
+            </a:r>
+            <a:r>
+              <a:rPr lang="tr-TR" dirty="0"/>
+              <a:t> ile gerçekleştirilecektir.</a:t>
+            </a:r>
+          </a:p>
+          <a:p>
+            <a:r>
+              <a:rPr lang="tr-TR" dirty="0"/>
+              <a:t>Düzenlenen veriler </a:t>
+            </a:r>
+            <a:r>
+              <a:rPr lang="tr-TR" dirty="0" err="1"/>
+              <a:t>Qlik</a:t>
+            </a:r>
+            <a:r>
+              <a:rPr lang="tr-TR" dirty="0"/>
+              <a:t> Sense </a:t>
+            </a:r>
+            <a:r>
+              <a:rPr lang="tr-TR" dirty="0" err="1"/>
+              <a:t>dashboardına</a:t>
+            </a:r>
+            <a:r>
+              <a:rPr lang="tr-TR" dirty="0"/>
+              <a:t> uygun hale getirilmesi adına </a:t>
+            </a:r>
+            <a:r>
+              <a:rPr lang="tr-TR" dirty="0" err="1"/>
+              <a:t>Qlik</a:t>
             </a:r>
             <a:r>
               <a:rPr lang="tr-TR" dirty="0"/>
@@ -7191,7 +8323,29 @@
             </a:r>
             <a:r>
               <a:rPr lang="tr-TR" dirty="0" err="1"/>
-              <a:t>websitesi</a:t>
+              <a:t>Script</a:t>
+            </a:r>
+            <a:r>
+              <a:rPr lang="tr-TR" dirty="0"/>
+              <a:t> kullanılarak ilgili BI </a:t>
+            </a:r>
+            <a:r>
+              <a:rPr lang="tr-TR" dirty="0" err="1"/>
+              <a:t>Tool</a:t>
+            </a:r>
+            <a:r>
+              <a:rPr lang="tr-TR" dirty="0"/>
+              <a:t> içerisinde finalize edilecektir.</a:t>
+            </a:r>
+          </a:p>
+          <a:p>
+            <a:r>
+              <a:rPr lang="tr-TR" dirty="0"/>
+              <a:t>Veri kaynağından tahminleme modeline, tahminleme modelinden </a:t>
+            </a:r>
+            <a:r>
+              <a:rPr lang="tr-TR" dirty="0" err="1"/>
+              <a:t>Qlik</a:t>
             </a:r>
             <a:r>
               <a:rPr lang="tr-TR" dirty="0"/>
@@ -7199,27 +8353,17 @@
             </a:r>
             <a:r>
               <a:rPr lang="tr-TR" dirty="0" err="1"/>
-              <a:t>API’si</a:t>
+              <a:t>Sense’e</a:t>
             </a:r>
             <a:r>
               <a:rPr lang="tr-TR" dirty="0"/>
-              <a:t> aracılığıyla Python kullanılarak toplanmıştır.</a:t>
-            </a:r>
-          </a:p>
-          <a:p>
-            <a:r>
-              <a:rPr lang="tr-TR" dirty="0" err="1"/>
-              <a:t>Meteostat</a:t>
-            </a:r>
+              <a:t> akan, güncelleme odaklı zincir veri yapısı hedeflenmektedir.</a:t>
+            </a:r>
+          </a:p>
+          <a:p>
             <a:r>
               <a:rPr lang="tr-TR" dirty="0"/>
-              <a:t>, veri kaynakları olarak yerel hava izleme istasyonlarını kullanmaktadır.</a:t>
-            </a:r>
-          </a:p>
-          <a:p>
-            <a:r>
-              <a:rPr lang="tr-TR" dirty="0"/>
-              <a:t>1929 ve 2007 İstanbul sıcaklığı verileri İstanbul/Göztepe hava izleme istasyonu bazlı, 2007 sonrası verileri İstanbul/Atatürk hava izleme istasyonu bazlıdır.</a:t>
+              <a:t>Uzun vadede, ek veri kaynaklarının da eklenmesiyle, İstanbul adına iklim değişikliği gidişatını gözlemleyen bir iş zekası modeli kurulması amaçlanmaktadır.</a:t>
             </a:r>
           </a:p>
         </p:txBody>
@@ -7227,7 +8371,7 @@
     </p:spTree>
     <p:extLst>
       <p:ext uri="{BB962C8B-B14F-4D97-AF65-F5344CB8AC3E}">
-        <p14:creationId xmlns:p14="http://schemas.microsoft.com/office/powerpoint/2010/main" val="1427517328"/>
+        <p14:creationId xmlns:p14="http://schemas.microsoft.com/office/powerpoint/2010/main" val="3438831964"/>
       </p:ext>
     </p:extLst>
   </p:cSld>
@@ -7254,90 +8398,1501 @@
           <a:chExt cx="0" cy="0"/>
         </a:xfrm>
       </p:grpSpPr>
-      <p:sp>
-        <p:nvSpPr>
-          <p:cNvPr id="2" name="Başlık 1">
+      <p:pic>
+        <p:nvPicPr>
+          <p:cNvPr id="1026" name="Picture 2" descr="Data, analytics, big data, data analytics, raw data icon - Download on  Iconfinder">
             <a:extLst>
               <a:ext uri="{FF2B5EF4-FFF2-40B4-BE49-F238E27FC236}">
-                <a16:creationId xmlns:a16="http://schemas.microsoft.com/office/drawing/2014/main" id="{97DC148F-08A1-2D53-740C-C6BBB6F7D5C0}"/>
+                <a16:creationId xmlns:a16="http://schemas.microsoft.com/office/drawing/2014/main" id="{01381E5B-C823-4C38-AB04-C14AECD1AD29}"/>
               </a:ext>
             </a:extLst>
           </p:cNvPr>
-          <p:cNvSpPr>
-            <a:spLocks noGrp="1"/>
-          </p:cNvSpPr>
-          <p:nvPr>
-            <p:ph type="title"/>
-          </p:nvPr>
-        </p:nvSpPr>
-        <p:spPr/>
-        <p:txBody>
-          <a:bodyPr/>
+          <p:cNvPicPr>
+            <a:picLocks noChangeAspect="1" noChangeArrowheads="1"/>
+          </p:cNvPicPr>
+          <p:nvPr/>
+        </p:nvPicPr>
+        <p:blipFill>
+          <a:blip r:embed="rId2">
+            <a:extLst>
+              <a:ext uri="{28A0092B-C50C-407E-A947-70E740481C1C}">
+                <a14:useLocalDpi xmlns:a14="http://schemas.microsoft.com/office/drawing/2010/main" val="0"/>
+              </a:ext>
+            </a:extLst>
+          </a:blip>
+          <a:srcRect/>
+          <a:stretch>
+            <a:fillRect/>
+          </a:stretch>
+        </p:blipFill>
+        <p:spPr bwMode="auto">
+          <a:xfrm>
+            <a:off x="98995" y="2428587"/>
+            <a:ext cx="1274762" cy="1274762"/>
+          </a:xfrm>
+          <a:prstGeom prst="rect">
+            <a:avLst/>
+          </a:prstGeom>
+          <a:noFill/>
+          <a:extLst>
+            <a:ext uri="{909E8E84-426E-40DD-AFC4-6F175D3DCCD1}">
+              <a14:hiddenFill xmlns:a14="http://schemas.microsoft.com/office/drawing/2010/main">
+                <a:solidFill>
+                  <a:srgbClr val="FFFFFF"/>
+                </a:solidFill>
+              </a14:hiddenFill>
+            </a:ext>
+          </a:extLst>
+        </p:spPr>
+      </p:pic>
+      <p:cxnSp>
+        <p:nvCxnSpPr>
+          <p:cNvPr id="5" name="Düz Ok Bağlayıcısı 4">
+            <a:extLst>
+              <a:ext uri="{FF2B5EF4-FFF2-40B4-BE49-F238E27FC236}">
+                <a16:creationId xmlns:a16="http://schemas.microsoft.com/office/drawing/2014/main" id="{37CCC2F0-99F5-472D-A486-3A4E05B91455}"/>
+              </a:ext>
+            </a:extLst>
+          </p:cNvPr>
+          <p:cNvCxnSpPr>
+            <a:cxnSpLocks/>
+            <a:stCxn id="1026" idx="3"/>
+            <a:endCxn id="1030" idx="1"/>
+          </p:cNvCxnSpPr>
+          <p:nvPr/>
+        </p:nvCxnSpPr>
+        <p:spPr>
+          <a:xfrm>
+            <a:off x="1373757" y="3065968"/>
+            <a:ext cx="1092387" cy="0"/>
+          </a:xfrm>
+          <a:prstGeom prst="straightConnector1">
+            <a:avLst/>
+          </a:prstGeom>
+          <a:ln w="9525" cap="flat" cmpd="sng" algn="ctr">
+            <a:solidFill>
+              <a:schemeClr val="accent5"/>
+            </a:solidFill>
+            <a:prstDash val="solid"/>
+            <a:round/>
+            <a:headEnd type="none" w="med" len="med"/>
+            <a:tailEnd type="arrow" w="med" len="med"/>
+          </a:ln>
+        </p:spPr>
+        <p:style>
+          <a:lnRef idx="0">
+            <a:scrgbClr r="0" g="0" b="0"/>
+          </a:lnRef>
+          <a:fillRef idx="0">
+            <a:scrgbClr r="0" g="0" b="0"/>
+          </a:fillRef>
+          <a:effectRef idx="0">
+            <a:scrgbClr r="0" g="0" b="0"/>
+          </a:effectRef>
+          <a:fontRef idx="minor">
+            <a:schemeClr val="tx1"/>
+          </a:fontRef>
+        </p:style>
+      </p:cxnSp>
+      <p:pic>
+        <p:nvPicPr>
+          <p:cNvPr id="1030" name="Picture 6" descr="Google Cloud Storage: solution for data lakes - Flowygo">
+            <a:extLst>
+              <a:ext uri="{FF2B5EF4-FFF2-40B4-BE49-F238E27FC236}">
+                <a16:creationId xmlns:a16="http://schemas.microsoft.com/office/drawing/2014/main" id="{C9C8D6AB-6224-4633-A59D-3ABCE1CEB078}"/>
+              </a:ext>
+            </a:extLst>
+          </p:cNvPr>
+          <p:cNvPicPr>
+            <a:picLocks noChangeAspect="1" noChangeArrowheads="1"/>
+          </p:cNvPicPr>
+          <p:nvPr/>
+        </p:nvPicPr>
+        <p:blipFill>
+          <a:blip r:embed="rId3">
+            <a:extLst>
+              <a:ext uri="{28A0092B-C50C-407E-A947-70E740481C1C}">
+                <a14:useLocalDpi xmlns:a14="http://schemas.microsoft.com/office/drawing/2010/main" val="0"/>
+              </a:ext>
+            </a:extLst>
+          </a:blip>
+          <a:srcRect/>
+          <a:stretch>
+            <a:fillRect/>
+          </a:stretch>
+        </p:blipFill>
+        <p:spPr bwMode="auto">
+          <a:xfrm>
+            <a:off x="2466144" y="2297221"/>
+            <a:ext cx="2172015" cy="1537494"/>
+          </a:xfrm>
+          <a:prstGeom prst="rect">
+            <a:avLst/>
+          </a:prstGeom>
+          <a:noFill/>
+          <a:extLst>
+            <a:ext uri="{909E8E84-426E-40DD-AFC4-6F175D3DCCD1}">
+              <a14:hiddenFill xmlns:a14="http://schemas.microsoft.com/office/drawing/2010/main">
+                <a:solidFill>
+                  <a:srgbClr val="FFFFFF"/>
+                </a:solidFill>
+              </a14:hiddenFill>
+            </a:ext>
+          </a:extLst>
+        </p:spPr>
+      </p:pic>
+      <p:cxnSp>
+        <p:nvCxnSpPr>
+          <p:cNvPr id="12" name="Düz Ok Bağlayıcısı 11">
+            <a:extLst>
+              <a:ext uri="{FF2B5EF4-FFF2-40B4-BE49-F238E27FC236}">
+                <a16:creationId xmlns:a16="http://schemas.microsoft.com/office/drawing/2014/main" id="{0EE29F0A-7F51-4460-A724-8CC601F1BCFF}"/>
+              </a:ext>
+            </a:extLst>
+          </p:cNvPr>
+          <p:cNvCxnSpPr>
+            <a:cxnSpLocks/>
+            <a:stCxn id="1030" idx="3"/>
+            <a:endCxn id="1034" idx="1"/>
+          </p:cNvCxnSpPr>
+          <p:nvPr/>
+        </p:nvCxnSpPr>
+        <p:spPr>
+          <a:xfrm>
+            <a:off x="4638159" y="3065968"/>
+            <a:ext cx="986567" cy="0"/>
+          </a:xfrm>
+          <a:prstGeom prst="straightConnector1">
+            <a:avLst/>
+          </a:prstGeom>
+          <a:ln w="9525" cap="flat" cmpd="sng" algn="ctr">
+            <a:solidFill>
+              <a:schemeClr val="accent5"/>
+            </a:solidFill>
+            <a:prstDash val="solid"/>
+            <a:round/>
+            <a:headEnd type="none" w="med" len="med"/>
+            <a:tailEnd type="arrow" w="med" len="med"/>
+          </a:ln>
+        </p:spPr>
+        <p:style>
+          <a:lnRef idx="0">
+            <a:scrgbClr r="0" g="0" b="0"/>
+          </a:lnRef>
+          <a:fillRef idx="0">
+            <a:scrgbClr r="0" g="0" b="0"/>
+          </a:fillRef>
+          <a:effectRef idx="0">
+            <a:scrgbClr r="0" g="0" b="0"/>
+          </a:effectRef>
+          <a:fontRef idx="minor">
+            <a:schemeClr val="tx1"/>
+          </a:fontRef>
+        </p:style>
+      </p:cxnSp>
+      <p:pic>
+        <p:nvPicPr>
+          <p:cNvPr id="1032" name="Picture 8" descr="MySQL Integration for Customer Success | Totango + MySQL">
+            <a:extLst>
+              <a:ext uri="{FF2B5EF4-FFF2-40B4-BE49-F238E27FC236}">
+                <a16:creationId xmlns:a16="http://schemas.microsoft.com/office/drawing/2014/main" id="{18237E2C-4404-4782-8AB3-0F33D22B70C2}"/>
+              </a:ext>
+            </a:extLst>
+          </p:cNvPr>
+          <p:cNvPicPr>
+            <a:picLocks noChangeAspect="1" noChangeArrowheads="1"/>
+          </p:cNvPicPr>
+          <p:nvPr/>
+        </p:nvPicPr>
+        <p:blipFill rotWithShape="1">
+          <a:blip r:embed="rId4">
+            <a:extLst>
+              <a:ext uri="{28A0092B-C50C-407E-A947-70E740481C1C}">
+                <a14:useLocalDpi xmlns:a14="http://schemas.microsoft.com/office/drawing/2010/main" val="0"/>
+              </a:ext>
+            </a:extLst>
+          </a:blip>
+          <a:srcRect l="11465" t="11792" r="10245" b="11740"/>
+          <a:stretch/>
+        </p:blipFill>
+        <p:spPr bwMode="auto">
+          <a:xfrm>
+            <a:off x="8029645" y="2612328"/>
+            <a:ext cx="1341197" cy="907280"/>
+          </a:xfrm>
+          <a:prstGeom prst="rect">
+            <a:avLst/>
+          </a:prstGeom>
+          <a:noFill/>
+          <a:extLst>
+            <a:ext uri="{909E8E84-426E-40DD-AFC4-6F175D3DCCD1}">
+              <a14:hiddenFill xmlns:a14="http://schemas.microsoft.com/office/drawing/2010/main">
+                <a:solidFill>
+                  <a:srgbClr val="FFFFFF"/>
+                </a:solidFill>
+              </a14:hiddenFill>
+            </a:ext>
+          </a:extLst>
+        </p:spPr>
+      </p:pic>
+      <p:pic>
+        <p:nvPicPr>
+          <p:cNvPr id="1034" name="Picture 10" descr="Project Jupyter - Wikipedia">
+            <a:extLst>
+              <a:ext uri="{FF2B5EF4-FFF2-40B4-BE49-F238E27FC236}">
+                <a16:creationId xmlns:a16="http://schemas.microsoft.com/office/drawing/2014/main" id="{D0330573-4DEF-4ECF-B403-E3EE87149AE7}"/>
+              </a:ext>
+            </a:extLst>
+          </p:cNvPr>
+          <p:cNvPicPr>
+            <a:picLocks noChangeAspect="1" noChangeArrowheads="1"/>
+          </p:cNvPicPr>
+          <p:nvPr/>
+        </p:nvPicPr>
+        <p:blipFill>
+          <a:blip r:embed="rId5">
+            <a:extLst>
+              <a:ext uri="{28A0092B-C50C-407E-A947-70E740481C1C}">
+                <a14:useLocalDpi xmlns:a14="http://schemas.microsoft.com/office/drawing/2010/main" val="0"/>
+              </a:ext>
+            </a:extLst>
+          </a:blip>
+          <a:srcRect/>
+          <a:stretch>
+            <a:fillRect/>
+          </a:stretch>
+        </p:blipFill>
+        <p:spPr bwMode="auto">
+          <a:xfrm>
+            <a:off x="5624726" y="2418611"/>
+            <a:ext cx="1112812" cy="1294714"/>
+          </a:xfrm>
+          <a:prstGeom prst="rect">
+            <a:avLst/>
+          </a:prstGeom>
+          <a:noFill/>
+          <a:extLst>
+            <a:ext uri="{909E8E84-426E-40DD-AFC4-6F175D3DCCD1}">
+              <a14:hiddenFill xmlns:a14="http://schemas.microsoft.com/office/drawing/2010/main">
+                <a:solidFill>
+                  <a:srgbClr val="FFFFFF"/>
+                </a:solidFill>
+              </a14:hiddenFill>
+            </a:ext>
+          </a:extLst>
+        </p:spPr>
+      </p:pic>
+      <p:pic>
+        <p:nvPicPr>
+          <p:cNvPr id="1036" name="Picture 12" descr="Sklearn Tutorial Python - Ander Fernández">
+            <a:extLst>
+              <a:ext uri="{FF2B5EF4-FFF2-40B4-BE49-F238E27FC236}">
+                <a16:creationId xmlns:a16="http://schemas.microsoft.com/office/drawing/2014/main" id="{3FF19353-664D-4E06-A3D3-7E27AD44BA08}"/>
+              </a:ext>
+            </a:extLst>
+          </p:cNvPr>
+          <p:cNvPicPr>
+            <a:picLocks noChangeAspect="1" noChangeArrowheads="1"/>
+          </p:cNvPicPr>
+          <p:nvPr/>
+        </p:nvPicPr>
+        <p:blipFill rotWithShape="1">
+          <a:blip r:embed="rId6">
+            <a:extLst>
+              <a:ext uri="{28A0092B-C50C-407E-A947-70E740481C1C}">
+                <a14:useLocalDpi xmlns:a14="http://schemas.microsoft.com/office/drawing/2010/main" val="0"/>
+              </a:ext>
+            </a:extLst>
+          </a:blip>
+          <a:srcRect l="27661" t="28688" r="29959" b="28168"/>
+          <a:stretch/>
+        </p:blipFill>
+        <p:spPr bwMode="auto">
+          <a:xfrm>
+            <a:off x="5624726" y="649003"/>
+            <a:ext cx="1112811" cy="656685"/>
+          </a:xfrm>
+          <a:prstGeom prst="rect">
+            <a:avLst/>
+          </a:prstGeom>
+          <a:noFill/>
+          <a:extLst>
+            <a:ext uri="{909E8E84-426E-40DD-AFC4-6F175D3DCCD1}">
+              <a14:hiddenFill xmlns:a14="http://schemas.microsoft.com/office/drawing/2010/main">
+                <a:solidFill>
+                  <a:srgbClr val="FFFFFF"/>
+                </a:solidFill>
+              </a14:hiddenFill>
+            </a:ext>
+          </a:extLst>
+        </p:spPr>
+      </p:pic>
+      <p:cxnSp>
+        <p:nvCxnSpPr>
+          <p:cNvPr id="19" name="Düz Ok Bağlayıcısı 18">
+            <a:extLst>
+              <a:ext uri="{FF2B5EF4-FFF2-40B4-BE49-F238E27FC236}">
+                <a16:creationId xmlns:a16="http://schemas.microsoft.com/office/drawing/2014/main" id="{A63640C5-9CBF-4348-8616-E56B0B2E7884}"/>
+              </a:ext>
+            </a:extLst>
+          </p:cNvPr>
+          <p:cNvCxnSpPr>
+            <a:cxnSpLocks/>
+            <a:stCxn id="1034" idx="3"/>
+            <a:endCxn id="1032" idx="1"/>
+          </p:cNvCxnSpPr>
+          <p:nvPr/>
+        </p:nvCxnSpPr>
+        <p:spPr>
+          <a:xfrm>
+            <a:off x="6737538" y="3065968"/>
+            <a:ext cx="1292107" cy="0"/>
+          </a:xfrm>
+          <a:prstGeom prst="straightConnector1">
+            <a:avLst/>
+          </a:prstGeom>
+          <a:ln w="9525" cap="flat" cmpd="sng" algn="ctr">
+            <a:solidFill>
+              <a:schemeClr val="accent5"/>
+            </a:solidFill>
+            <a:prstDash val="solid"/>
+            <a:round/>
+            <a:headEnd type="none" w="med" len="med"/>
+            <a:tailEnd type="arrow" w="med" len="med"/>
+          </a:ln>
+        </p:spPr>
+        <p:style>
+          <a:lnRef idx="0">
+            <a:scrgbClr r="0" g="0" b="0"/>
+          </a:lnRef>
+          <a:fillRef idx="0">
+            <a:scrgbClr r="0" g="0" b="0"/>
+          </a:fillRef>
+          <a:effectRef idx="0">
+            <a:scrgbClr r="0" g="0" b="0"/>
+          </a:effectRef>
+          <a:fontRef idx="minor">
+            <a:schemeClr val="tx1"/>
+          </a:fontRef>
+        </p:style>
+      </p:cxnSp>
+      <p:cxnSp>
+        <p:nvCxnSpPr>
+          <p:cNvPr id="20" name="Düz Ok Bağlayıcısı 19">
+            <a:extLst>
+              <a:ext uri="{FF2B5EF4-FFF2-40B4-BE49-F238E27FC236}">
+                <a16:creationId xmlns:a16="http://schemas.microsoft.com/office/drawing/2014/main" id="{F38D7CEE-4976-4CB2-BF21-BAC733B8A7FE}"/>
+              </a:ext>
+            </a:extLst>
+          </p:cNvPr>
+          <p:cNvCxnSpPr>
+            <a:cxnSpLocks/>
+            <a:stCxn id="1032" idx="3"/>
+            <a:endCxn id="1038" idx="1"/>
+          </p:cNvCxnSpPr>
+          <p:nvPr/>
+        </p:nvCxnSpPr>
+        <p:spPr>
+          <a:xfrm>
+            <a:off x="9370842" y="3065968"/>
+            <a:ext cx="940413" cy="0"/>
+          </a:xfrm>
+          <a:prstGeom prst="straightConnector1">
+            <a:avLst/>
+          </a:prstGeom>
+          <a:ln w="9525" cap="flat" cmpd="sng" algn="ctr">
+            <a:solidFill>
+              <a:schemeClr val="accent5"/>
+            </a:solidFill>
+            <a:prstDash val="solid"/>
+            <a:round/>
+            <a:headEnd type="none" w="med" len="med"/>
+            <a:tailEnd type="arrow" w="med" len="med"/>
+          </a:ln>
+        </p:spPr>
+        <p:style>
+          <a:lnRef idx="0">
+            <a:scrgbClr r="0" g="0" b="0"/>
+          </a:lnRef>
+          <a:fillRef idx="0">
+            <a:scrgbClr r="0" g="0" b="0"/>
+          </a:fillRef>
+          <a:effectRef idx="0">
+            <a:scrgbClr r="0" g="0" b="0"/>
+          </a:effectRef>
+          <a:fontRef idx="minor">
+            <a:schemeClr val="tx1"/>
+          </a:fontRef>
+        </p:style>
+      </p:cxnSp>
+      <p:pic>
+        <p:nvPicPr>
+          <p:cNvPr id="1038" name="Picture 14" descr="Qlik Sense">
+            <a:extLst>
+              <a:ext uri="{FF2B5EF4-FFF2-40B4-BE49-F238E27FC236}">
+                <a16:creationId xmlns:a16="http://schemas.microsoft.com/office/drawing/2014/main" id="{9AF05488-7254-4043-9524-8601D6E29B20}"/>
+              </a:ext>
+            </a:extLst>
+          </p:cNvPr>
+          <p:cNvPicPr>
+            <a:picLocks noChangeAspect="1" noChangeArrowheads="1"/>
+          </p:cNvPicPr>
+          <p:nvPr/>
+        </p:nvPicPr>
+        <p:blipFill rotWithShape="1">
+          <a:blip r:embed="rId7">
+            <a:extLst>
+              <a:ext uri="{28A0092B-C50C-407E-A947-70E740481C1C}">
+                <a14:useLocalDpi xmlns:a14="http://schemas.microsoft.com/office/drawing/2010/main" val="0"/>
+              </a:ext>
+            </a:extLst>
+          </a:blip>
+          <a:srcRect l="11212" t="25722" r="9274" b="25380"/>
+          <a:stretch/>
+        </p:blipFill>
+        <p:spPr bwMode="auto">
+          <a:xfrm>
+            <a:off x="10311255" y="2791545"/>
+            <a:ext cx="1341198" cy="548845"/>
+          </a:xfrm>
+          <a:prstGeom prst="rect">
+            <a:avLst/>
+          </a:prstGeom>
+          <a:noFill/>
+          <a:extLst>
+            <a:ext uri="{909E8E84-426E-40DD-AFC4-6F175D3DCCD1}">
+              <a14:hiddenFill xmlns:a14="http://schemas.microsoft.com/office/drawing/2010/main">
+                <a:solidFill>
+                  <a:srgbClr val="FFFFFF"/>
+                </a:solidFill>
+              </a14:hiddenFill>
+            </a:ext>
+          </a:extLst>
+        </p:spPr>
+      </p:pic>
+      <p:pic>
+        <p:nvPicPr>
+          <p:cNvPr id="1040" name="Picture 16" descr="Catboost vs Neural Network | MLJAR">
+            <a:extLst>
+              <a:ext uri="{FF2B5EF4-FFF2-40B4-BE49-F238E27FC236}">
+                <a16:creationId xmlns:a16="http://schemas.microsoft.com/office/drawing/2014/main" id="{FCB2451B-9E86-4EF1-B37D-0096911AECB1}"/>
+              </a:ext>
+            </a:extLst>
+          </p:cNvPr>
+          <p:cNvPicPr>
+            <a:picLocks noChangeAspect="1" noChangeArrowheads="1"/>
+          </p:cNvPicPr>
+          <p:nvPr/>
+        </p:nvPicPr>
+        <p:blipFill rotWithShape="1">
+          <a:blip r:embed="rId8">
+            <a:extLst>
+              <a:ext uri="{28A0092B-C50C-407E-A947-70E740481C1C}">
+                <a14:useLocalDpi xmlns:a14="http://schemas.microsoft.com/office/drawing/2010/main" val="0"/>
+              </a:ext>
+            </a:extLst>
+          </a:blip>
+          <a:srcRect l="9525" t="21005" r="13839" b="20624"/>
+          <a:stretch/>
+        </p:blipFill>
+        <p:spPr bwMode="auto">
+          <a:xfrm>
+            <a:off x="4894974" y="1377223"/>
+            <a:ext cx="1050038" cy="334201"/>
+          </a:xfrm>
+          <a:prstGeom prst="rect">
+            <a:avLst/>
+          </a:prstGeom>
+          <a:noFill/>
+          <a:extLst>
+            <a:ext uri="{909E8E84-426E-40DD-AFC4-6F175D3DCCD1}">
+              <a14:hiddenFill xmlns:a14="http://schemas.microsoft.com/office/drawing/2010/main">
+                <a:solidFill>
+                  <a:srgbClr val="FFFFFF"/>
+                </a:solidFill>
+              </a14:hiddenFill>
+            </a:ext>
+          </a:extLst>
+        </p:spPr>
+      </p:pic>
+      <p:pic>
+        <p:nvPicPr>
+          <p:cNvPr id="1042" name="Picture 18" descr="Xgboost vs Baseline | MLJAR">
+            <a:extLst>
+              <a:ext uri="{FF2B5EF4-FFF2-40B4-BE49-F238E27FC236}">
+                <a16:creationId xmlns:a16="http://schemas.microsoft.com/office/drawing/2014/main" id="{94588499-4B78-4B9C-B1E2-AC7F5DFD128C}"/>
+              </a:ext>
+            </a:extLst>
+          </p:cNvPr>
+          <p:cNvPicPr>
+            <a:picLocks noChangeAspect="1" noChangeArrowheads="1"/>
+          </p:cNvPicPr>
+          <p:nvPr/>
+        </p:nvPicPr>
+        <p:blipFill rotWithShape="1">
+          <a:blip r:embed="rId9">
+            <a:extLst>
+              <a:ext uri="{28A0092B-C50C-407E-A947-70E740481C1C}">
+                <a14:useLocalDpi xmlns:a14="http://schemas.microsoft.com/office/drawing/2010/main" val="0"/>
+              </a:ext>
+            </a:extLst>
+          </a:blip>
+          <a:srcRect t="16694" b="26866"/>
+          <a:stretch/>
+        </p:blipFill>
+        <p:spPr bwMode="auto">
+          <a:xfrm>
+            <a:off x="6397860" y="1467317"/>
+            <a:ext cx="974672" cy="222844"/>
+          </a:xfrm>
+          <a:prstGeom prst="rect">
+            <a:avLst/>
+          </a:prstGeom>
+          <a:noFill/>
+          <a:extLst>
+            <a:ext uri="{909E8E84-426E-40DD-AFC4-6F175D3DCCD1}">
+              <a14:hiddenFill xmlns:a14="http://schemas.microsoft.com/office/drawing/2010/main">
+                <a:solidFill>
+                  <a:srgbClr val="FFFFFF"/>
+                </a:solidFill>
+              </a14:hiddenFill>
+            </a:ext>
+          </a:extLst>
+        </p:spPr>
+      </p:pic>
+      <p:cxnSp>
+        <p:nvCxnSpPr>
+          <p:cNvPr id="47" name="Düz Ok Bağlayıcısı 46">
+            <a:extLst>
+              <a:ext uri="{FF2B5EF4-FFF2-40B4-BE49-F238E27FC236}">
+                <a16:creationId xmlns:a16="http://schemas.microsoft.com/office/drawing/2014/main" id="{E4FA9DF9-AFEE-49B6-AC83-C53D425142CC}"/>
+              </a:ext>
+            </a:extLst>
+          </p:cNvPr>
+          <p:cNvCxnSpPr>
+            <a:cxnSpLocks/>
+            <a:stCxn id="1040" idx="2"/>
+            <a:endCxn id="1034" idx="0"/>
+          </p:cNvCxnSpPr>
+          <p:nvPr/>
+        </p:nvCxnSpPr>
+        <p:spPr>
+          <a:xfrm>
+            <a:off x="5419993" y="1711424"/>
+            <a:ext cx="761139" cy="707187"/>
+          </a:xfrm>
+          <a:prstGeom prst="straightConnector1">
+            <a:avLst/>
+          </a:prstGeom>
+          <a:ln w="9525" cap="flat" cmpd="sng" algn="ctr">
+            <a:solidFill>
+              <a:schemeClr val="accent6"/>
+            </a:solidFill>
+            <a:prstDash val="dash"/>
+            <a:round/>
+            <a:headEnd type="none" w="med" len="med"/>
+            <a:tailEnd type="none" w="med" len="med"/>
+          </a:ln>
+        </p:spPr>
+        <p:style>
+          <a:lnRef idx="0">
+            <a:scrgbClr r="0" g="0" b="0"/>
+          </a:lnRef>
+          <a:fillRef idx="0">
+            <a:scrgbClr r="0" g="0" b="0"/>
+          </a:fillRef>
+          <a:effectRef idx="0">
+            <a:scrgbClr r="0" g="0" b="0"/>
+          </a:effectRef>
+          <a:fontRef idx="minor">
+            <a:schemeClr val="tx1"/>
+          </a:fontRef>
+        </p:style>
+      </p:cxnSp>
+      <p:cxnSp>
+        <p:nvCxnSpPr>
+          <p:cNvPr id="50" name="Düz Ok Bağlayıcısı 49">
+            <a:extLst>
+              <a:ext uri="{FF2B5EF4-FFF2-40B4-BE49-F238E27FC236}">
+                <a16:creationId xmlns:a16="http://schemas.microsoft.com/office/drawing/2014/main" id="{02FBB207-C3D3-42F6-9882-48BDE6731C5F}"/>
+              </a:ext>
+            </a:extLst>
+          </p:cNvPr>
+          <p:cNvCxnSpPr>
+            <a:cxnSpLocks/>
+            <a:stCxn id="1036" idx="2"/>
+            <a:endCxn id="1034" idx="0"/>
+          </p:cNvCxnSpPr>
+          <p:nvPr/>
+        </p:nvCxnSpPr>
+        <p:spPr>
+          <a:xfrm>
+            <a:off x="6181132" y="1305688"/>
+            <a:ext cx="0" cy="1112923"/>
+          </a:xfrm>
+          <a:prstGeom prst="straightConnector1">
+            <a:avLst/>
+          </a:prstGeom>
+          <a:ln w="9525" cap="flat" cmpd="sng" algn="ctr">
+            <a:solidFill>
+              <a:schemeClr val="accent6"/>
+            </a:solidFill>
+            <a:prstDash val="dash"/>
+            <a:round/>
+            <a:headEnd type="none" w="med" len="med"/>
+            <a:tailEnd type="none" w="med" len="med"/>
+          </a:ln>
+        </p:spPr>
+        <p:style>
+          <a:lnRef idx="0">
+            <a:scrgbClr r="0" g="0" b="0"/>
+          </a:lnRef>
+          <a:fillRef idx="0">
+            <a:scrgbClr r="0" g="0" b="0"/>
+          </a:fillRef>
+          <a:effectRef idx="0">
+            <a:scrgbClr r="0" g="0" b="0"/>
+          </a:effectRef>
+          <a:fontRef idx="minor">
+            <a:schemeClr val="tx1"/>
+          </a:fontRef>
+        </p:style>
+      </p:cxnSp>
+      <p:cxnSp>
+        <p:nvCxnSpPr>
+          <p:cNvPr id="53" name="Düz Ok Bağlayıcısı 52">
+            <a:extLst>
+              <a:ext uri="{FF2B5EF4-FFF2-40B4-BE49-F238E27FC236}">
+                <a16:creationId xmlns:a16="http://schemas.microsoft.com/office/drawing/2014/main" id="{76D4D054-563C-43BA-8E34-3EB79F1589BE}"/>
+              </a:ext>
+            </a:extLst>
+          </p:cNvPr>
+          <p:cNvCxnSpPr>
+            <a:cxnSpLocks/>
+          </p:cNvCxnSpPr>
+          <p:nvPr/>
+        </p:nvCxnSpPr>
+        <p:spPr>
+          <a:xfrm flipH="1">
+            <a:off x="6181132" y="1709011"/>
+            <a:ext cx="704064" cy="728450"/>
+          </a:xfrm>
+          <a:prstGeom prst="straightConnector1">
+            <a:avLst/>
+          </a:prstGeom>
+          <a:ln w="9525" cap="flat" cmpd="sng" algn="ctr">
+            <a:solidFill>
+              <a:schemeClr val="accent6"/>
+            </a:solidFill>
+            <a:prstDash val="dash"/>
+            <a:round/>
+            <a:headEnd type="none" w="med" len="med"/>
+            <a:tailEnd type="none" w="med" len="med"/>
+          </a:ln>
+        </p:spPr>
+        <p:style>
+          <a:lnRef idx="0">
+            <a:scrgbClr r="0" g="0" b="0"/>
+          </a:lnRef>
+          <a:fillRef idx="0">
+            <a:scrgbClr r="0" g="0" b="0"/>
+          </a:fillRef>
+          <a:effectRef idx="0">
+            <a:scrgbClr r="0" g="0" b="0"/>
+          </a:effectRef>
+          <a:fontRef idx="minor">
+            <a:schemeClr val="tx1"/>
+          </a:fontRef>
+        </p:style>
+      </p:cxnSp>
+      <p:sp>
+        <p:nvSpPr>
+          <p:cNvPr id="1078" name="Dikdörtgen 1077">
+            <a:extLst>
+              <a:ext uri="{FF2B5EF4-FFF2-40B4-BE49-F238E27FC236}">
+                <a16:creationId xmlns:a16="http://schemas.microsoft.com/office/drawing/2014/main" id="{FC1DBE89-D71B-4DC9-A859-A5845B09CC5A}"/>
+              </a:ext>
+            </a:extLst>
+          </p:cNvPr>
+          <p:cNvSpPr/>
+          <p:nvPr/>
+        </p:nvSpPr>
+        <p:spPr>
+          <a:xfrm>
+            <a:off x="2479346" y="3833250"/>
+            <a:ext cx="2172015" cy="1073547"/>
+          </a:xfrm>
+          <a:prstGeom prst="rect">
+            <a:avLst/>
+          </a:prstGeom>
+          <a:solidFill>
+            <a:srgbClr val="C00000">
+              <a:alpha val="42000"/>
+            </a:srgbClr>
+          </a:solidFill>
+        </p:spPr>
+        <p:style>
+          <a:lnRef idx="2">
+            <a:schemeClr val="accent1">
+              <a:shade val="50000"/>
+            </a:schemeClr>
+          </a:lnRef>
+          <a:fillRef idx="1">
+            <a:schemeClr val="accent1"/>
+          </a:fillRef>
+          <a:effectRef idx="0">
+            <a:schemeClr val="accent1"/>
+          </a:effectRef>
+          <a:fontRef idx="minor">
+            <a:schemeClr val="lt1"/>
+          </a:fontRef>
+        </p:style>
+        <p:txBody>
+          <a:bodyPr rtlCol="0" anchor="ctr"/>
           <a:lstStyle/>
           <a:p>
-            <a:r>
-              <a:rPr lang="tr-TR" dirty="0"/>
-              <a:t>Veri Kaynakları</a:t>
-            </a:r>
-            <a:br>
-              <a:rPr lang="tr-TR" dirty="0"/>
-            </a:br>
-            <a:r>
-              <a:rPr lang="tr-TR" sz="1800" b="1" i="1" dirty="0"/>
-              <a:t>-Yerel İstanbul Verileri</a:t>
-            </a:r>
-            <a:endParaRPr lang="tr-TR" dirty="0"/>
-          </a:p>
-        </p:txBody>
-      </p:sp>
-      <p:sp>
-        <p:nvSpPr>
-          <p:cNvPr id="3" name="İçerik Yer Tutucusu 2">
+            <a:pPr algn="ctr"/>
+            <a:r>
+              <a:rPr lang="tr-TR" dirty="0">
+                <a:solidFill>
+                  <a:schemeClr val="tx1"/>
+                </a:solidFill>
+              </a:rPr>
+              <a:t>Data Lake</a:t>
+            </a:r>
+          </a:p>
+        </p:txBody>
+      </p:sp>
+      <p:sp>
+        <p:nvSpPr>
+          <p:cNvPr id="123" name="Dikdörtgen 122">
             <a:extLst>
               <a:ext uri="{FF2B5EF4-FFF2-40B4-BE49-F238E27FC236}">
-                <a16:creationId xmlns:a16="http://schemas.microsoft.com/office/drawing/2014/main" id="{C8BEF4A0-337D-885E-9D9F-4E029C6A5A78}"/>
+                <a16:creationId xmlns:a16="http://schemas.microsoft.com/office/drawing/2014/main" id="{4791733A-42E0-41BF-96BE-2FE49D80DB71}"/>
               </a:ext>
             </a:extLst>
           </p:cNvPr>
-          <p:cNvSpPr>
-            <a:spLocks noGrp="1"/>
-          </p:cNvSpPr>
-          <p:nvPr>
-            <p:ph idx="1"/>
-          </p:nvPr>
-        </p:nvSpPr>
-        <p:spPr/>
-        <p:txBody>
-          <a:bodyPr/>
+          <p:cNvSpPr/>
+          <p:nvPr/>
+        </p:nvSpPr>
+        <p:spPr>
+          <a:xfrm>
+            <a:off x="4702649" y="3834715"/>
+            <a:ext cx="2982781" cy="1073548"/>
+          </a:xfrm>
+          <a:prstGeom prst="rect">
+            <a:avLst/>
+          </a:prstGeom>
+          <a:solidFill>
+            <a:schemeClr val="accent4">
+              <a:lumMod val="75000"/>
+              <a:alpha val="42000"/>
+            </a:schemeClr>
+          </a:solidFill>
+        </p:spPr>
+        <p:style>
+          <a:lnRef idx="2">
+            <a:schemeClr val="accent1">
+              <a:shade val="50000"/>
+            </a:schemeClr>
+          </a:lnRef>
+          <a:fillRef idx="1">
+            <a:schemeClr val="accent1"/>
+          </a:fillRef>
+          <a:effectRef idx="0">
+            <a:schemeClr val="accent1"/>
+          </a:effectRef>
+          <a:fontRef idx="minor">
+            <a:schemeClr val="lt1"/>
+          </a:fontRef>
+        </p:style>
+        <p:txBody>
+          <a:bodyPr rtlCol="0" anchor="ctr"/>
           <a:lstStyle/>
           <a:p>
-            <a:r>
-              <a:rPr lang="tr-TR" dirty="0"/>
-              <a:t>Yerel veriler trafik yoğunluğu, toplu taşıma kullanımı oranları, ağaçlandırma çalışmaları, baraj yoğunluğu ve su tüketimi bilgilerini içermektedir.</a:t>
-            </a:r>
-          </a:p>
-          <a:p>
-            <a:r>
-              <a:rPr lang="tr-TR" dirty="0"/>
-              <a:t>İlgili veriler İstanbul Büyükşehir Belediyesi’nin resmi veri platformu olan </a:t>
-            </a:r>
-            <a:r>
-              <a:rPr lang="tr-TR" dirty="0" err="1">
-                <a:hlinkClick r:id="rId2"/>
+            <a:pPr algn="ctr"/>
+            <a:r>
+              <a:rPr lang="en-GB" dirty="0">
+                <a:solidFill>
+                  <a:schemeClr val="tx1"/>
+                </a:solidFill>
               </a:rPr>
-              <a:t>data.istanbul</a:t>
-            </a:r>
-            <a:r>
-              <a:rPr lang="tr-TR" dirty="0"/>
-              <a:t> platformundan alınmıştır.</a:t>
-            </a:r>
-          </a:p>
-        </p:txBody>
-      </p:sp>
+              <a:t>Data Processing</a:t>
+            </a:r>
+          </a:p>
+        </p:txBody>
+      </p:sp>
+      <p:sp>
+        <p:nvSpPr>
+          <p:cNvPr id="124" name="Dikdörtgen 123">
+            <a:extLst>
+              <a:ext uri="{FF2B5EF4-FFF2-40B4-BE49-F238E27FC236}">
+                <a16:creationId xmlns:a16="http://schemas.microsoft.com/office/drawing/2014/main" id="{17C52E0C-4B40-4E38-B499-C69C72FE5627}"/>
+              </a:ext>
+            </a:extLst>
+          </p:cNvPr>
+          <p:cNvSpPr/>
+          <p:nvPr/>
+        </p:nvSpPr>
+        <p:spPr>
+          <a:xfrm>
+            <a:off x="7748861" y="3833915"/>
+            <a:ext cx="2096440" cy="1073548"/>
+          </a:xfrm>
+          <a:prstGeom prst="rect">
+            <a:avLst/>
+          </a:prstGeom>
+          <a:solidFill>
+            <a:srgbClr val="7030A0">
+              <a:alpha val="42000"/>
+            </a:srgbClr>
+          </a:solidFill>
+        </p:spPr>
+        <p:style>
+          <a:lnRef idx="2">
+            <a:schemeClr val="accent1">
+              <a:shade val="50000"/>
+            </a:schemeClr>
+          </a:lnRef>
+          <a:fillRef idx="1">
+            <a:schemeClr val="accent1"/>
+          </a:fillRef>
+          <a:effectRef idx="0">
+            <a:schemeClr val="accent1"/>
+          </a:effectRef>
+          <a:fontRef idx="minor">
+            <a:schemeClr val="lt1"/>
+          </a:fontRef>
+        </p:style>
+        <p:txBody>
+          <a:bodyPr rtlCol="0" anchor="ctr"/>
+          <a:lstStyle/>
+          <a:p>
+            <a:pPr algn="ctr"/>
+            <a:r>
+              <a:rPr lang="en-GB" dirty="0"/>
+              <a:t>Data Warehouse</a:t>
+            </a:r>
+          </a:p>
+        </p:txBody>
+      </p:sp>
+      <p:sp>
+        <p:nvSpPr>
+          <p:cNvPr id="125" name="Dikdörtgen 124">
+            <a:extLst>
+              <a:ext uri="{FF2B5EF4-FFF2-40B4-BE49-F238E27FC236}">
+                <a16:creationId xmlns:a16="http://schemas.microsoft.com/office/drawing/2014/main" id="{A726D78E-11A9-4BC8-AF84-2DD15E12831B}"/>
+              </a:ext>
+            </a:extLst>
+          </p:cNvPr>
+          <p:cNvSpPr/>
+          <p:nvPr/>
+        </p:nvSpPr>
+        <p:spPr>
+          <a:xfrm>
+            <a:off x="9908733" y="3833250"/>
+            <a:ext cx="2096440" cy="1074213"/>
+          </a:xfrm>
+          <a:prstGeom prst="rect">
+            <a:avLst/>
+          </a:prstGeom>
+          <a:solidFill>
+            <a:srgbClr val="0070C0">
+              <a:alpha val="42000"/>
+            </a:srgbClr>
+          </a:solidFill>
+        </p:spPr>
+        <p:style>
+          <a:lnRef idx="2">
+            <a:schemeClr val="accent1">
+              <a:shade val="50000"/>
+            </a:schemeClr>
+          </a:lnRef>
+          <a:fillRef idx="1">
+            <a:schemeClr val="accent1"/>
+          </a:fillRef>
+          <a:effectRef idx="0">
+            <a:schemeClr val="accent1"/>
+          </a:effectRef>
+          <a:fontRef idx="minor">
+            <a:schemeClr val="lt1"/>
+          </a:fontRef>
+        </p:style>
+        <p:txBody>
+          <a:bodyPr rtlCol="0" anchor="ctr"/>
+          <a:lstStyle/>
+          <a:p>
+            <a:pPr algn="ctr"/>
+            <a:r>
+              <a:rPr lang="en-GB" dirty="0">
+                <a:solidFill>
+                  <a:schemeClr val="tx1"/>
+                </a:solidFill>
+              </a:rPr>
+              <a:t>Data Visualising</a:t>
+            </a:r>
+          </a:p>
+        </p:txBody>
+      </p:sp>
+      <p:pic>
+        <p:nvPicPr>
+          <p:cNvPr id="6" name="Resim 5" descr="metin, yazı tipi, logo, grafik içeren bir resim&#10;&#10;Açıklama otomatik olarak oluşturuldu">
+            <a:extLst>
+              <a:ext uri="{FF2B5EF4-FFF2-40B4-BE49-F238E27FC236}">
+                <a16:creationId xmlns:a16="http://schemas.microsoft.com/office/drawing/2014/main" id="{DB50BD11-CD4F-5F64-C6B2-8A77E3232CB2}"/>
+              </a:ext>
+            </a:extLst>
+          </p:cNvPr>
+          <p:cNvPicPr>
+            <a:picLocks noChangeAspect="1"/>
+          </p:cNvPicPr>
+          <p:nvPr/>
+        </p:nvPicPr>
+        <p:blipFill>
+          <a:blip r:embed="rId10">
+            <a:extLst>
+              <a:ext uri="{28A0092B-C50C-407E-A947-70E740481C1C}">
+                <a14:useLocalDpi xmlns:a14="http://schemas.microsoft.com/office/drawing/2010/main" val="0"/>
+              </a:ext>
+            </a:extLst>
+          </a:blip>
+          <a:stretch>
+            <a:fillRect/>
+          </a:stretch>
+        </p:blipFill>
+        <p:spPr>
+          <a:xfrm>
+            <a:off x="7383591" y="1104730"/>
+            <a:ext cx="1685365" cy="948018"/>
+          </a:xfrm>
+          <a:prstGeom prst="rect">
+            <a:avLst/>
+          </a:prstGeom>
+        </p:spPr>
+      </p:pic>
+      <p:cxnSp>
+        <p:nvCxnSpPr>
+          <p:cNvPr id="7" name="Düz Ok Bağlayıcısı 6">
+            <a:extLst>
+              <a:ext uri="{FF2B5EF4-FFF2-40B4-BE49-F238E27FC236}">
+                <a16:creationId xmlns:a16="http://schemas.microsoft.com/office/drawing/2014/main" id="{E28F5D32-4617-691A-5A6B-F3FB66CFF901}"/>
+              </a:ext>
+            </a:extLst>
+          </p:cNvPr>
+          <p:cNvCxnSpPr>
+            <a:cxnSpLocks/>
+            <a:endCxn id="1034" idx="0"/>
+          </p:cNvCxnSpPr>
+          <p:nvPr/>
+        </p:nvCxnSpPr>
+        <p:spPr>
+          <a:xfrm flipH="1">
+            <a:off x="6181132" y="1725400"/>
+            <a:ext cx="1657517" cy="693211"/>
+          </a:xfrm>
+          <a:prstGeom prst="straightConnector1">
+            <a:avLst/>
+          </a:prstGeom>
+          <a:ln w="9525" cap="flat" cmpd="sng" algn="ctr">
+            <a:solidFill>
+              <a:schemeClr val="accent6"/>
+            </a:solidFill>
+            <a:prstDash val="dash"/>
+            <a:round/>
+            <a:headEnd type="none" w="med" len="med"/>
+            <a:tailEnd type="none" w="med" len="med"/>
+          </a:ln>
+        </p:spPr>
+        <p:style>
+          <a:lnRef idx="0">
+            <a:scrgbClr r="0" g="0" b="0"/>
+          </a:lnRef>
+          <a:fillRef idx="0">
+            <a:scrgbClr r="0" g="0" b="0"/>
+          </a:fillRef>
+          <a:effectRef idx="0">
+            <a:scrgbClr r="0" g="0" b="0"/>
+          </a:effectRef>
+          <a:fontRef idx="minor">
+            <a:schemeClr val="tx1"/>
+          </a:fontRef>
+        </p:style>
+      </p:cxnSp>
+      <p:pic>
+        <p:nvPicPr>
+          <p:cNvPr id="10" name="Resim 9" descr="sarı, tasarım içeren bir resim&#10;&#10;Açıklama otomatik olarak oluşturuldu">
+            <a:extLst>
+              <a:ext uri="{FF2B5EF4-FFF2-40B4-BE49-F238E27FC236}">
+                <a16:creationId xmlns:a16="http://schemas.microsoft.com/office/drawing/2014/main" id="{52CE52BA-9086-39D7-7320-0EA0B60085C3}"/>
+              </a:ext>
+            </a:extLst>
+          </p:cNvPr>
+          <p:cNvPicPr>
+            <a:picLocks noChangeAspect="1"/>
+          </p:cNvPicPr>
+          <p:nvPr/>
+        </p:nvPicPr>
+        <p:blipFill>
+          <a:blip r:embed="rId11">
+            <a:extLst>
+              <a:ext uri="{28A0092B-C50C-407E-A947-70E740481C1C}">
+                <a14:useLocalDpi xmlns:a14="http://schemas.microsoft.com/office/drawing/2010/main" val="0"/>
+              </a:ext>
+            </a:extLst>
+          </a:blip>
+          <a:stretch>
+            <a:fillRect/>
+          </a:stretch>
+        </p:blipFill>
+        <p:spPr>
+          <a:xfrm>
+            <a:off x="3593955" y="1006259"/>
+            <a:ext cx="1044204" cy="1116428"/>
+          </a:xfrm>
+          <a:prstGeom prst="rect">
+            <a:avLst/>
+          </a:prstGeom>
+        </p:spPr>
+      </p:pic>
+      <p:cxnSp>
+        <p:nvCxnSpPr>
+          <p:cNvPr id="11" name="Düz Ok Bağlayıcısı 10">
+            <a:extLst>
+              <a:ext uri="{FF2B5EF4-FFF2-40B4-BE49-F238E27FC236}">
+                <a16:creationId xmlns:a16="http://schemas.microsoft.com/office/drawing/2014/main" id="{56398CA8-35FF-B563-3845-4D68169E8248}"/>
+              </a:ext>
+            </a:extLst>
+          </p:cNvPr>
+          <p:cNvCxnSpPr>
+            <a:cxnSpLocks/>
+            <a:endCxn id="1034" idx="0"/>
+          </p:cNvCxnSpPr>
+          <p:nvPr/>
+        </p:nvCxnSpPr>
+        <p:spPr>
+          <a:xfrm>
+            <a:off x="4388973" y="1769093"/>
+            <a:ext cx="1792159" cy="649518"/>
+          </a:xfrm>
+          <a:prstGeom prst="straightConnector1">
+            <a:avLst/>
+          </a:prstGeom>
+          <a:ln w="9525" cap="flat" cmpd="sng" algn="ctr">
+            <a:solidFill>
+              <a:schemeClr val="accent6"/>
+            </a:solidFill>
+            <a:prstDash val="dash"/>
+            <a:round/>
+            <a:headEnd type="none" w="med" len="med"/>
+            <a:tailEnd type="none" w="med" len="med"/>
+          </a:ln>
+        </p:spPr>
+        <p:style>
+          <a:lnRef idx="0">
+            <a:scrgbClr r="0" g="0" b="0"/>
+          </a:lnRef>
+          <a:fillRef idx="0">
+            <a:scrgbClr r="0" g="0" b="0"/>
+          </a:fillRef>
+          <a:effectRef idx="0">
+            <a:scrgbClr r="0" g="0" b="0"/>
+          </a:effectRef>
+          <a:fontRef idx="minor">
+            <a:schemeClr val="tx1"/>
+          </a:fontRef>
+        </p:style>
+      </p:cxnSp>
+      <p:pic>
+        <p:nvPicPr>
+          <p:cNvPr id="17" name="Resim 16" descr="ekran görüntüsü, grafik, grafik tasarım, yazı tipi içeren bir resim&#10;&#10;Açıklama otomatik olarak oluşturuldu">
+            <a:extLst>
+              <a:ext uri="{FF2B5EF4-FFF2-40B4-BE49-F238E27FC236}">
+                <a16:creationId xmlns:a16="http://schemas.microsoft.com/office/drawing/2014/main" id="{358CC205-959D-2A93-7CD7-39A941FD821C}"/>
+              </a:ext>
+            </a:extLst>
+          </p:cNvPr>
+          <p:cNvPicPr>
+            <a:picLocks noChangeAspect="1"/>
+          </p:cNvPicPr>
+          <p:nvPr/>
+        </p:nvPicPr>
+        <p:blipFill>
+          <a:blip r:embed="rId12">
+            <a:extLst>
+              <a:ext uri="{28A0092B-C50C-407E-A947-70E740481C1C}">
+                <a14:useLocalDpi xmlns:a14="http://schemas.microsoft.com/office/drawing/2010/main" val="0"/>
+              </a:ext>
+            </a:extLst>
+          </a:blip>
+          <a:stretch>
+            <a:fillRect/>
+          </a:stretch>
+        </p:blipFill>
+        <p:spPr>
+          <a:xfrm>
+            <a:off x="4567041" y="-37416"/>
+            <a:ext cx="2115369" cy="855237"/>
+          </a:xfrm>
+          <a:prstGeom prst="rect">
+            <a:avLst/>
+          </a:prstGeom>
+        </p:spPr>
+      </p:pic>
+      <p:pic>
+        <p:nvPicPr>
+          <p:cNvPr id="21" name="Resim 20" descr="grafik, yazı tipi, grafik tasarım, logo içeren bir resim&#10;&#10;Açıklama otomatik olarak oluşturuldu">
+            <a:extLst>
+              <a:ext uri="{FF2B5EF4-FFF2-40B4-BE49-F238E27FC236}">
+                <a16:creationId xmlns:a16="http://schemas.microsoft.com/office/drawing/2014/main" id="{C33324C1-8363-C51D-DCE7-DEAA8C6BBFE2}"/>
+              </a:ext>
+            </a:extLst>
+          </p:cNvPr>
+          <p:cNvPicPr>
+            <a:picLocks noChangeAspect="1"/>
+          </p:cNvPicPr>
+          <p:nvPr/>
+        </p:nvPicPr>
+        <p:blipFill>
+          <a:blip r:embed="rId13">
+            <a:extLst>
+              <a:ext uri="{28A0092B-C50C-407E-A947-70E740481C1C}">
+                <a14:useLocalDpi xmlns:a14="http://schemas.microsoft.com/office/drawing/2010/main" val="0"/>
+              </a:ext>
+            </a:extLst>
+          </a:blip>
+          <a:stretch>
+            <a:fillRect/>
+          </a:stretch>
+        </p:blipFill>
+        <p:spPr>
+          <a:xfrm>
+            <a:off x="1918731" y="-37417"/>
+            <a:ext cx="2387142" cy="941855"/>
+          </a:xfrm>
+          <a:prstGeom prst="rect">
+            <a:avLst/>
+          </a:prstGeom>
+        </p:spPr>
+      </p:pic>
+      <p:pic>
+        <p:nvPicPr>
+          <p:cNvPr id="23" name="Resim 22" descr="grafik, logo, grafik tasarım, yazı tipi içeren bir resim&#10;&#10;Açıklama otomatik olarak oluşturuldu">
+            <a:extLst>
+              <a:ext uri="{FF2B5EF4-FFF2-40B4-BE49-F238E27FC236}">
+                <a16:creationId xmlns:a16="http://schemas.microsoft.com/office/drawing/2014/main" id="{4F1BF7C0-B8CB-B8B2-6810-2F9F4DD4D744}"/>
+              </a:ext>
+            </a:extLst>
+          </p:cNvPr>
+          <p:cNvPicPr>
+            <a:picLocks noChangeAspect="1"/>
+          </p:cNvPicPr>
+          <p:nvPr/>
+        </p:nvPicPr>
+        <p:blipFill>
+          <a:blip r:embed="rId14">
+            <a:extLst>
+              <a:ext uri="{28A0092B-C50C-407E-A947-70E740481C1C}">
+                <a14:useLocalDpi xmlns:a14="http://schemas.microsoft.com/office/drawing/2010/main" val="0"/>
+              </a:ext>
+            </a:extLst>
+          </a:blip>
+          <a:stretch>
+            <a:fillRect/>
+          </a:stretch>
+        </p:blipFill>
+        <p:spPr>
+          <a:xfrm>
+            <a:off x="8529620" y="71097"/>
+            <a:ext cx="2758225" cy="551645"/>
+          </a:xfrm>
+          <a:prstGeom prst="rect">
+            <a:avLst/>
+          </a:prstGeom>
+        </p:spPr>
+      </p:pic>
+      <p:pic>
+        <p:nvPicPr>
+          <p:cNvPr id="25" name="Resim 24" descr="grafik, yazı tipi, ekran görüntüsü, logo içeren bir resim&#10;&#10;Açıklama otomatik olarak oluşturuldu">
+            <a:extLst>
+              <a:ext uri="{FF2B5EF4-FFF2-40B4-BE49-F238E27FC236}">
+                <a16:creationId xmlns:a16="http://schemas.microsoft.com/office/drawing/2014/main" id="{E1004564-BC4D-709F-875C-A0007F63B6E4}"/>
+              </a:ext>
+            </a:extLst>
+          </p:cNvPr>
+          <p:cNvPicPr>
+            <a:picLocks noChangeAspect="1"/>
+          </p:cNvPicPr>
+          <p:nvPr/>
+        </p:nvPicPr>
+        <p:blipFill>
+          <a:blip r:embed="rId15">
+            <a:extLst>
+              <a:ext uri="{28A0092B-C50C-407E-A947-70E740481C1C}">
+                <a14:useLocalDpi xmlns:a14="http://schemas.microsoft.com/office/drawing/2010/main" val="0"/>
+              </a:ext>
+            </a:extLst>
+          </a:blip>
+          <a:stretch>
+            <a:fillRect/>
+          </a:stretch>
+        </p:blipFill>
+        <p:spPr>
+          <a:xfrm>
+            <a:off x="7009890" y="507531"/>
+            <a:ext cx="2096440" cy="634819"/>
+          </a:xfrm>
+          <a:prstGeom prst="rect">
+            <a:avLst/>
+          </a:prstGeom>
+        </p:spPr>
+      </p:pic>
+      <p:cxnSp>
+        <p:nvCxnSpPr>
+          <p:cNvPr id="26" name="Düz Ok Bağlayıcısı 25">
+            <a:extLst>
+              <a:ext uri="{FF2B5EF4-FFF2-40B4-BE49-F238E27FC236}">
+                <a16:creationId xmlns:a16="http://schemas.microsoft.com/office/drawing/2014/main" id="{C5E4B802-E721-FC51-A1AC-7DEBC3E7C16A}"/>
+              </a:ext>
+            </a:extLst>
+          </p:cNvPr>
+          <p:cNvCxnSpPr>
+            <a:cxnSpLocks/>
+            <a:stCxn id="25" idx="0"/>
+            <a:endCxn id="17" idx="3"/>
+          </p:cNvCxnSpPr>
+          <p:nvPr/>
+        </p:nvCxnSpPr>
+        <p:spPr>
+          <a:xfrm flipH="1" flipV="1">
+            <a:off x="6682410" y="390203"/>
+            <a:ext cx="1375700" cy="117328"/>
+          </a:xfrm>
+          <a:prstGeom prst="straightConnector1">
+            <a:avLst/>
+          </a:prstGeom>
+          <a:ln w="9525" cap="flat" cmpd="sng" algn="ctr">
+            <a:solidFill>
+              <a:schemeClr val="accent6"/>
+            </a:solidFill>
+            <a:prstDash val="dash"/>
+            <a:round/>
+            <a:headEnd type="none" w="med" len="med"/>
+            <a:tailEnd type="none" w="med" len="med"/>
+          </a:ln>
+        </p:spPr>
+        <p:style>
+          <a:lnRef idx="0">
+            <a:scrgbClr r="0" g="0" b="0"/>
+          </a:lnRef>
+          <a:fillRef idx="0">
+            <a:scrgbClr r="0" g="0" b="0"/>
+          </a:fillRef>
+          <a:effectRef idx="0">
+            <a:scrgbClr r="0" g="0" b="0"/>
+          </a:effectRef>
+          <a:fontRef idx="minor">
+            <a:schemeClr val="tx1"/>
+          </a:fontRef>
+        </p:style>
+      </p:cxnSp>
+      <p:cxnSp>
+        <p:nvCxnSpPr>
+          <p:cNvPr id="29" name="Düz Ok Bağlayıcısı 28">
+            <a:extLst>
+              <a:ext uri="{FF2B5EF4-FFF2-40B4-BE49-F238E27FC236}">
+                <a16:creationId xmlns:a16="http://schemas.microsoft.com/office/drawing/2014/main" id="{AE0882F9-8E56-F60A-6067-F2FD5385E10B}"/>
+              </a:ext>
+            </a:extLst>
+          </p:cNvPr>
+          <p:cNvCxnSpPr>
+            <a:cxnSpLocks/>
+            <a:stCxn id="23" idx="1"/>
+            <a:endCxn id="25" idx="0"/>
+          </p:cNvCxnSpPr>
+          <p:nvPr/>
+        </p:nvCxnSpPr>
+        <p:spPr>
+          <a:xfrm flipH="1">
+            <a:off x="8058110" y="346920"/>
+            <a:ext cx="471510" cy="160611"/>
+          </a:xfrm>
+          <a:prstGeom prst="straightConnector1">
+            <a:avLst/>
+          </a:prstGeom>
+          <a:ln w="9525" cap="flat" cmpd="sng" algn="ctr">
+            <a:solidFill>
+              <a:schemeClr val="accent6"/>
+            </a:solidFill>
+            <a:prstDash val="dash"/>
+            <a:round/>
+            <a:headEnd type="none" w="med" len="med"/>
+            <a:tailEnd type="none" w="med" len="med"/>
+          </a:ln>
+        </p:spPr>
+        <p:style>
+          <a:lnRef idx="0">
+            <a:scrgbClr r="0" g="0" b="0"/>
+          </a:lnRef>
+          <a:fillRef idx="0">
+            <a:scrgbClr r="0" g="0" b="0"/>
+          </a:fillRef>
+          <a:effectRef idx="0">
+            <a:scrgbClr r="0" g="0" b="0"/>
+          </a:effectRef>
+          <a:fontRef idx="minor">
+            <a:schemeClr val="tx1"/>
+          </a:fontRef>
+        </p:style>
+      </p:cxnSp>
+      <p:cxnSp>
+        <p:nvCxnSpPr>
+          <p:cNvPr id="32" name="Düz Ok Bağlayıcısı 31">
+            <a:extLst>
+              <a:ext uri="{FF2B5EF4-FFF2-40B4-BE49-F238E27FC236}">
+                <a16:creationId xmlns:a16="http://schemas.microsoft.com/office/drawing/2014/main" id="{B3628AB0-4203-BE7A-61BE-EDB06BD17FAB}"/>
+              </a:ext>
+            </a:extLst>
+          </p:cNvPr>
+          <p:cNvCxnSpPr>
+            <a:cxnSpLocks/>
+            <a:stCxn id="17" idx="1"/>
+            <a:endCxn id="21" idx="3"/>
+          </p:cNvCxnSpPr>
+          <p:nvPr/>
+        </p:nvCxnSpPr>
+        <p:spPr>
+          <a:xfrm flipH="1">
+            <a:off x="4305873" y="390203"/>
+            <a:ext cx="261168" cy="43308"/>
+          </a:xfrm>
+          <a:prstGeom prst="straightConnector1">
+            <a:avLst/>
+          </a:prstGeom>
+          <a:ln w="9525" cap="flat" cmpd="sng" algn="ctr">
+            <a:solidFill>
+              <a:schemeClr val="accent6"/>
+            </a:solidFill>
+            <a:prstDash val="dash"/>
+            <a:round/>
+            <a:headEnd type="none" w="med" len="med"/>
+            <a:tailEnd type="none" w="med" len="med"/>
+          </a:ln>
+        </p:spPr>
+        <p:style>
+          <a:lnRef idx="0">
+            <a:scrgbClr r="0" g="0" b="0"/>
+          </a:lnRef>
+          <a:fillRef idx="0">
+            <a:scrgbClr r="0" g="0" b="0"/>
+          </a:fillRef>
+          <a:effectRef idx="0">
+            <a:scrgbClr r="0" g="0" b="0"/>
+          </a:effectRef>
+          <a:fontRef idx="minor">
+            <a:schemeClr val="tx1"/>
+          </a:fontRef>
+        </p:style>
+      </p:cxnSp>
+      <p:cxnSp>
+        <p:nvCxnSpPr>
+          <p:cNvPr id="35" name="Düz Ok Bağlayıcısı 34">
+            <a:extLst>
+              <a:ext uri="{FF2B5EF4-FFF2-40B4-BE49-F238E27FC236}">
+                <a16:creationId xmlns:a16="http://schemas.microsoft.com/office/drawing/2014/main" id="{AEC29AAA-7056-4AA5-BB99-C4F3C225C216}"/>
+              </a:ext>
+            </a:extLst>
+          </p:cNvPr>
+          <p:cNvCxnSpPr>
+            <a:cxnSpLocks/>
+            <a:stCxn id="21" idx="2"/>
+            <a:endCxn id="10" idx="1"/>
+          </p:cNvCxnSpPr>
+          <p:nvPr/>
+        </p:nvCxnSpPr>
+        <p:spPr>
+          <a:xfrm>
+            <a:off x="3112302" y="904438"/>
+            <a:ext cx="481653" cy="660035"/>
+          </a:xfrm>
+          <a:prstGeom prst="straightConnector1">
+            <a:avLst/>
+          </a:prstGeom>
+          <a:ln w="9525" cap="flat" cmpd="sng" algn="ctr">
+            <a:solidFill>
+              <a:schemeClr val="accent6"/>
+            </a:solidFill>
+            <a:prstDash val="dash"/>
+            <a:round/>
+            <a:headEnd type="none" w="med" len="med"/>
+            <a:tailEnd type="none" w="med" len="med"/>
+          </a:ln>
+        </p:spPr>
+        <p:style>
+          <a:lnRef idx="0">
+            <a:scrgbClr r="0" g="0" b="0"/>
+          </a:lnRef>
+          <a:fillRef idx="0">
+            <a:scrgbClr r="0" g="0" b="0"/>
+          </a:fillRef>
+          <a:effectRef idx="0">
+            <a:scrgbClr r="0" g="0" b="0"/>
+          </a:effectRef>
+          <a:fontRef idx="minor">
+            <a:schemeClr val="tx1"/>
+          </a:fontRef>
+        </p:style>
+      </p:cxnSp>
+      <p:cxnSp>
+        <p:nvCxnSpPr>
+          <p:cNvPr id="39" name="Düz Ok Bağlayıcısı 38">
+            <a:extLst>
+              <a:ext uri="{FF2B5EF4-FFF2-40B4-BE49-F238E27FC236}">
+                <a16:creationId xmlns:a16="http://schemas.microsoft.com/office/drawing/2014/main" id="{1CCF1838-48E5-3C12-ECF9-8ABAE754ACE0}"/>
+              </a:ext>
+            </a:extLst>
+          </p:cNvPr>
+          <p:cNvCxnSpPr>
+            <a:cxnSpLocks/>
+          </p:cNvCxnSpPr>
+          <p:nvPr/>
+        </p:nvCxnSpPr>
+        <p:spPr>
+          <a:xfrm>
+            <a:off x="5419992" y="466984"/>
+            <a:ext cx="805649" cy="182019"/>
+          </a:xfrm>
+          <a:prstGeom prst="straightConnector1">
+            <a:avLst/>
+          </a:prstGeom>
+          <a:ln w="9525" cap="flat" cmpd="sng" algn="ctr">
+            <a:solidFill>
+              <a:schemeClr val="accent6"/>
+            </a:solidFill>
+            <a:prstDash val="dash"/>
+            <a:round/>
+            <a:headEnd type="none" w="med" len="med"/>
+            <a:tailEnd type="none" w="med" len="med"/>
+          </a:ln>
+        </p:spPr>
+        <p:style>
+          <a:lnRef idx="0">
+            <a:scrgbClr r="0" g="0" b="0"/>
+          </a:lnRef>
+          <a:fillRef idx="0">
+            <a:scrgbClr r="0" g="0" b="0"/>
+          </a:fillRef>
+          <a:effectRef idx="0">
+            <a:scrgbClr r="0" g="0" b="0"/>
+          </a:effectRef>
+          <a:fontRef idx="minor">
+            <a:schemeClr val="tx1"/>
+          </a:fontRef>
+        </p:style>
+      </p:cxnSp>
     </p:spTree>
     <p:extLst>
       <p:ext uri="{BB962C8B-B14F-4D97-AF65-F5344CB8AC3E}">
-        <p14:creationId xmlns:p14="http://schemas.microsoft.com/office/powerpoint/2010/main" val="2509655991"/>
+        <p14:creationId xmlns:p14="http://schemas.microsoft.com/office/powerpoint/2010/main" val="2230209346"/>
       </p:ext>
     </p:extLst>
   </p:cSld>
@@ -7369,7 +9924,7 @@
           <p:cNvPr id="2" name="Başlık 1">
             <a:extLst>
               <a:ext uri="{FF2B5EF4-FFF2-40B4-BE49-F238E27FC236}">
-                <a16:creationId xmlns:a16="http://schemas.microsoft.com/office/drawing/2014/main" id="{98851459-2B94-3F70-3A85-EF60D44340F1}"/>
+                <a16:creationId xmlns:a16="http://schemas.microsoft.com/office/drawing/2014/main" id="{7533D3D1-3747-C0E6-7893-324C4255DDDF}"/>
               </a:ext>
             </a:extLst>
           </p:cNvPr>
@@ -7382,7 +9937,9 @@
         </p:nvSpPr>
         <p:spPr/>
         <p:txBody>
-          <a:bodyPr/>
+          <a:bodyPr>
+            <a:normAutofit/>
+          </a:bodyPr>
           <a:lstStyle/>
           <a:p>
             <a:r>
@@ -7394,9 +9951,8 @@
             </a:br>
             <a:r>
               <a:rPr lang="tr-TR" sz="1800" b="1" i="1" dirty="0"/>
-              <a:t>-Sera Gazı Verileri</a:t>
-            </a:r>
-            <a:endParaRPr lang="tr-TR" dirty="0"/>
+              <a:t>-İklim Verileri</a:t>
+            </a:r>
           </a:p>
         </p:txBody>
       </p:sp>
@@ -7405,7 +9961,7 @@
           <p:cNvPr id="3" name="İçerik Yer Tutucusu 2">
             <a:extLst>
               <a:ext uri="{FF2B5EF4-FFF2-40B4-BE49-F238E27FC236}">
-                <a16:creationId xmlns:a16="http://schemas.microsoft.com/office/drawing/2014/main" id="{DB4FB418-8FA4-043B-831F-84D7E7A9612E}"/>
+                <a16:creationId xmlns:a16="http://schemas.microsoft.com/office/drawing/2014/main" id="{9440007B-0DD1-F5F7-9A36-A12964D7C04A}"/>
               </a:ext>
             </a:extLst>
           </p:cNvPr>
@@ -7423,27 +9979,49 @@
           <a:p>
             <a:r>
               <a:rPr lang="tr-TR" dirty="0"/>
-              <a:t>OWID (</a:t>
+              <a:t>Veriler </a:t>
+            </a:r>
+            <a:r>
+              <a:rPr lang="tr-TR" dirty="0" err="1">
+                <a:hlinkClick r:id="rId2" action="ppaction://hlinkfile"/>
+              </a:rPr>
+              <a:t>Meteostat</a:t>
+            </a:r>
+            <a:r>
+              <a:rPr lang="tr-TR" dirty="0"/>
+              <a:t> </a:t>
             </a:r>
             <a:r>
               <a:rPr lang="tr-TR" dirty="0" err="1"/>
-              <a:t>Our</a:t>
+              <a:t>websitesi</a:t>
             </a:r>
             <a:r>
               <a:rPr lang="tr-TR" dirty="0"/>
-              <a:t> World in Data) platformu sera gazı verilerinin temel kaynağı olmuştur. Oxford kaynaklı olan platformun bütün dünya ülkeleri bazlı geniş sera gazı emisyonu ver çalışmaları bulunmaktadır.</a:t>
-            </a:r>
-          </a:p>
-          <a:p>
+              <a:t> </a:t>
+            </a:r>
+            <a:r>
+              <a:rPr lang="tr-TR" dirty="0" err="1"/>
+              <a:t>API’si</a:t>
+            </a:r>
             <a:r>
               <a:rPr lang="tr-TR" dirty="0"/>
-              <a:t>TÜİK bir diğer sera gazı veri sağlayıcısı olmuştur.</a:t>
-            </a:r>
-          </a:p>
-          <a:p>
+              <a:t> aracılığıyla Python kullanılarak toplanmıştır.</a:t>
+            </a:r>
+          </a:p>
+          <a:p>
+            <a:r>
+              <a:rPr lang="tr-TR" dirty="0" err="1"/>
+              <a:t>Meteostat</a:t>
+            </a:r>
             <a:r>
               <a:rPr lang="tr-TR" dirty="0"/>
-              <a:t>OWID ve TÜİK’in yayınladığı veriler tutarlılık göstermektedir.</a:t>
+              <a:t>, veri kaynakları olarak yerel hava izleme istasyonlarını kullanmaktadır.</a:t>
+            </a:r>
+          </a:p>
+          <a:p>
+            <a:r>
+              <a:rPr lang="tr-TR" dirty="0"/>
+              <a:t>1929 ve 2007 İstanbul sıcaklığı verileri İstanbul/Göztepe hava izleme istasyonu bazlı, 2007 sonrası verileri İstanbul/Atatürk hava izleme istasyonu bazlıdır.</a:t>
             </a:r>
           </a:p>
         </p:txBody>
@@ -7451,7 +10029,7 @@
     </p:spTree>
     <p:extLst>
       <p:ext uri="{BB962C8B-B14F-4D97-AF65-F5344CB8AC3E}">
-        <p14:creationId xmlns:p14="http://schemas.microsoft.com/office/powerpoint/2010/main" val="3888449224"/>
+        <p14:creationId xmlns:p14="http://schemas.microsoft.com/office/powerpoint/2010/main" val="1427517328"/>
       </p:ext>
     </p:extLst>
   </p:cSld>
@@ -7483,7 +10061,7 @@
           <p:cNvPr id="2" name="Başlık 1">
             <a:extLst>
               <a:ext uri="{FF2B5EF4-FFF2-40B4-BE49-F238E27FC236}">
-                <a16:creationId xmlns:a16="http://schemas.microsoft.com/office/drawing/2014/main" id="{3ACC7431-E00D-5006-99E3-4122781B374F}"/>
+                <a16:creationId xmlns:a16="http://schemas.microsoft.com/office/drawing/2014/main" id="{97DC148F-08A1-2D53-740C-C6BBB6F7D5C0}"/>
               </a:ext>
             </a:extLst>
           </p:cNvPr>
@@ -7491,7 +10069,7 @@
             <a:spLocks noGrp="1"/>
           </p:cNvSpPr>
           <p:nvPr>
-            <p:ph type="ctrTitle"/>
+            <p:ph type="title"/>
           </p:nvPr>
         </p:nvSpPr>
         <p:spPr/>
@@ -7501,7 +10079,59 @@
           <a:p>
             <a:r>
               <a:rPr lang="tr-TR" dirty="0"/>
-              <a:t>Bulgular</a:t>
+              <a:t>Veri Kaynakları</a:t>
+            </a:r>
+            <a:br>
+              <a:rPr lang="tr-TR" dirty="0"/>
+            </a:br>
+            <a:r>
+              <a:rPr lang="tr-TR" sz="1800" b="1" i="1" dirty="0"/>
+              <a:t>-Yerel İstanbul Verileri</a:t>
+            </a:r>
+            <a:endParaRPr lang="tr-TR" dirty="0"/>
+          </a:p>
+        </p:txBody>
+      </p:sp>
+      <p:sp>
+        <p:nvSpPr>
+          <p:cNvPr id="3" name="İçerik Yer Tutucusu 2">
+            <a:extLst>
+              <a:ext uri="{FF2B5EF4-FFF2-40B4-BE49-F238E27FC236}">
+                <a16:creationId xmlns:a16="http://schemas.microsoft.com/office/drawing/2014/main" id="{C8BEF4A0-337D-885E-9D9F-4E029C6A5A78}"/>
+              </a:ext>
+            </a:extLst>
+          </p:cNvPr>
+          <p:cNvSpPr>
+            <a:spLocks noGrp="1"/>
+          </p:cNvSpPr>
+          <p:nvPr>
+            <p:ph idx="1"/>
+          </p:nvPr>
+        </p:nvSpPr>
+        <p:spPr/>
+        <p:txBody>
+          <a:bodyPr/>
+          <a:lstStyle/>
+          <a:p>
+            <a:r>
+              <a:rPr lang="tr-TR" dirty="0"/>
+              <a:t>Yerel veriler trafik yoğunluğu, toplu taşıma kullanımı oranları, ağaçlandırma çalışmaları, baraj yoğunluğu ve su tüketimi bilgilerini içermektedir.</a:t>
+            </a:r>
+          </a:p>
+          <a:p>
+            <a:r>
+              <a:rPr lang="tr-TR" dirty="0"/>
+              <a:t>İlgili veriler İstanbul Büyükşehir Belediyesi’nin resmi veri platformu olan </a:t>
+            </a:r>
+            <a:r>
+              <a:rPr lang="tr-TR" dirty="0" err="1">
+                <a:hlinkClick r:id="rId2"/>
+              </a:rPr>
+              <a:t>data.istanbul</a:t>
+            </a:r>
+            <a:r>
+              <a:rPr lang="tr-TR" dirty="0"/>
+              <a:t> platformundan alınmıştır.</a:t>
             </a:r>
           </a:p>
         </p:txBody>
@@ -7509,7 +10139,7 @@
     </p:spTree>
     <p:extLst>
       <p:ext uri="{BB962C8B-B14F-4D97-AF65-F5344CB8AC3E}">
-        <p14:creationId xmlns:p14="http://schemas.microsoft.com/office/powerpoint/2010/main" val="3415842329"/>
+        <p14:creationId xmlns:p14="http://schemas.microsoft.com/office/powerpoint/2010/main" val="2509655991"/>
       </p:ext>
     </p:extLst>
   </p:cSld>
@@ -7536,45 +10166,106 @@
           <a:chExt cx="0" cy="0"/>
         </a:xfrm>
       </p:grpSpPr>
-      <p:pic>
-        <p:nvPicPr>
-          <p:cNvPr id="5" name="İçerik Yer Tutucusu 4">
+      <p:sp>
+        <p:nvSpPr>
+          <p:cNvPr id="2" name="Başlık 1">
             <a:extLst>
               <a:ext uri="{FF2B5EF4-FFF2-40B4-BE49-F238E27FC236}">
-                <a16:creationId xmlns:a16="http://schemas.microsoft.com/office/drawing/2014/main" id="{67D4D572-723B-E72F-81C7-B35C5E0E04F7}"/>
+                <a16:creationId xmlns:a16="http://schemas.microsoft.com/office/drawing/2014/main" id="{98851459-2B94-3F70-3A85-EF60D44340F1}"/>
               </a:ext>
             </a:extLst>
           </p:cNvPr>
-          <p:cNvPicPr>
-            <a:picLocks noGrp="1" noChangeAspect="1"/>
-          </p:cNvPicPr>
+          <p:cNvSpPr>
+            <a:spLocks noGrp="1"/>
+          </p:cNvSpPr>
+          <p:nvPr>
+            <p:ph type="title"/>
+          </p:nvPr>
+        </p:nvSpPr>
+        <p:spPr/>
+        <p:txBody>
+          <a:bodyPr/>
+          <a:lstStyle/>
+          <a:p>
+            <a:r>
+              <a:rPr lang="tr-TR" dirty="0"/>
+              <a:t>Veri Kaynakları</a:t>
+            </a:r>
+            <a:br>
+              <a:rPr lang="tr-TR" dirty="0"/>
+            </a:br>
+            <a:r>
+              <a:rPr lang="tr-TR" sz="1800" b="1" i="1" dirty="0"/>
+              <a:t>-Sera Gazı Verileri</a:t>
+            </a:r>
+            <a:endParaRPr lang="tr-TR" dirty="0"/>
+          </a:p>
+        </p:txBody>
+      </p:sp>
+      <p:sp>
+        <p:nvSpPr>
+          <p:cNvPr id="3" name="İçerik Yer Tutucusu 2">
+            <a:extLst>
+              <a:ext uri="{FF2B5EF4-FFF2-40B4-BE49-F238E27FC236}">
+                <a16:creationId xmlns:a16="http://schemas.microsoft.com/office/drawing/2014/main" id="{DB4FB418-8FA4-043B-831F-84D7E7A9612E}"/>
+              </a:ext>
+            </a:extLst>
+          </p:cNvPr>
+          <p:cNvSpPr>
+            <a:spLocks noGrp="1"/>
+          </p:cNvSpPr>
           <p:nvPr>
             <p:ph idx="1"/>
           </p:nvPr>
-        </p:nvPicPr>
-        <p:blipFill>
-          <a:blip r:embed="rId2">
-            <a:extLst>
-              <a:ext uri="{28A0092B-C50C-407E-A947-70E740481C1C}">
-                <a14:useLocalDpi xmlns:a14="http://schemas.microsoft.com/office/drawing/2010/main" val="0"/>
-              </a:ext>
-            </a:extLst>
-          </a:blip>
-          <a:stretch>
-            <a:fillRect/>
-          </a:stretch>
-        </p:blipFill>
-        <p:spPr>
-          <a:xfrm>
-            <a:off x="840979" y="0"/>
-            <a:ext cx="10286999" cy="6858000"/>
-          </a:xfrm>
-        </p:spPr>
-      </p:pic>
+        </p:nvSpPr>
+        <p:spPr/>
+        <p:txBody>
+          <a:bodyPr/>
+          <a:lstStyle/>
+          <a:p>
+            <a:r>
+              <a:rPr lang="tr-TR" dirty="0">
+                <a:hlinkClick r:id="rId2"/>
+              </a:rPr>
+              <a:t>OWID</a:t>
+            </a:r>
+            <a:r>
+              <a:rPr lang="tr-TR" dirty="0"/>
+              <a:t> (</a:t>
+            </a:r>
+            <a:r>
+              <a:rPr lang="tr-TR" dirty="0" err="1"/>
+              <a:t>Our</a:t>
+            </a:r>
+            <a:r>
+              <a:rPr lang="tr-TR" dirty="0"/>
+              <a:t> World in Data) platformu sera gazı verilerinin temel kaynağı olmuştur. Oxford kaynaklı olan platformun bütün dünya ülkeleri bazlı geniş sera gazı emisyonu ver çalışmaları bulunmaktadır.</a:t>
+            </a:r>
+          </a:p>
+          <a:p>
+            <a:r>
+              <a:rPr lang="tr-TR" dirty="0">
+                <a:hlinkClick r:id="rId3"/>
+              </a:rPr>
+              <a:t>TÜİK</a:t>
+            </a:r>
+            <a:r>
+              <a:rPr lang="tr-TR" dirty="0"/>
+              <a:t> bir diğer sera gazı veri sağlayıcısı olmuştur.</a:t>
+            </a:r>
+          </a:p>
+          <a:p>
+            <a:r>
+              <a:rPr lang="tr-TR" dirty="0"/>
+              <a:t>OWID ve TÜİK’in yayınladığı veriler tutarlılık göstermektedir.</a:t>
+            </a:r>
+          </a:p>
+        </p:txBody>
+      </p:sp>
     </p:spTree>
     <p:extLst>
       <p:ext uri="{BB962C8B-B14F-4D97-AF65-F5344CB8AC3E}">
-        <p14:creationId xmlns:p14="http://schemas.microsoft.com/office/powerpoint/2010/main" val="1613990799"/>
+        <p14:creationId xmlns:p14="http://schemas.microsoft.com/office/powerpoint/2010/main" val="3888449224"/>
       </p:ext>
     </p:extLst>
   </p:cSld>
@@ -7601,46 +10292,38 @@
           <a:chExt cx="0" cy="0"/>
         </a:xfrm>
       </p:grpSpPr>
-      <p:pic>
-        <p:nvPicPr>
-          <p:cNvPr id="5" name="Resim 4">
+      <p:sp>
+        <p:nvSpPr>
+          <p:cNvPr id="2" name="Başlık 1">
             <a:extLst>
               <a:ext uri="{FF2B5EF4-FFF2-40B4-BE49-F238E27FC236}">
-                <a16:creationId xmlns:a16="http://schemas.microsoft.com/office/drawing/2014/main" id="{9A09A0E3-7079-999E-1A86-607000844BE8}"/>
+                <a16:creationId xmlns:a16="http://schemas.microsoft.com/office/drawing/2014/main" id="{3ACC7431-E00D-5006-99E3-4122781B374F}"/>
               </a:ext>
             </a:extLst>
           </p:cNvPr>
-          <p:cNvPicPr>
-            <a:picLocks noChangeAspect="1"/>
-          </p:cNvPicPr>
-          <p:nvPr/>
-        </p:nvPicPr>
-        <p:blipFill>
-          <a:blip r:embed="rId2">
-            <a:extLst>
-              <a:ext uri="{28A0092B-C50C-407E-A947-70E740481C1C}">
-                <a14:useLocalDpi xmlns:a14="http://schemas.microsoft.com/office/drawing/2010/main" val="0"/>
-              </a:ext>
-            </a:extLst>
-          </a:blip>
-          <a:stretch>
-            <a:fillRect/>
-          </a:stretch>
-        </p:blipFill>
-        <p:spPr>
-          <a:xfrm>
-            <a:off x="952500" y="0"/>
-            <a:ext cx="10287000" cy="6858000"/>
-          </a:xfrm>
-          <a:prstGeom prst="rect">
-            <a:avLst/>
-          </a:prstGeom>
-        </p:spPr>
-      </p:pic>
+          <p:cNvSpPr>
+            <a:spLocks noGrp="1"/>
+          </p:cNvSpPr>
+          <p:nvPr>
+            <p:ph type="ctrTitle"/>
+          </p:nvPr>
+        </p:nvSpPr>
+        <p:spPr/>
+        <p:txBody>
+          <a:bodyPr/>
+          <a:lstStyle/>
+          <a:p>
+            <a:r>
+              <a:rPr lang="tr-TR" dirty="0"/>
+              <a:t>Bulgular</a:t>
+            </a:r>
+          </a:p>
+        </p:txBody>
+      </p:sp>
     </p:spTree>
     <p:extLst>
       <p:ext uri="{BB962C8B-B14F-4D97-AF65-F5344CB8AC3E}">
-        <p14:creationId xmlns:p14="http://schemas.microsoft.com/office/powerpoint/2010/main" val="554691366"/>
+        <p14:creationId xmlns:p14="http://schemas.microsoft.com/office/powerpoint/2010/main" val="3415842329"/>
       </p:ext>
     </p:extLst>
   </p:cSld>
@@ -7669,17 +10352,19 @@
       </p:grpSpPr>
       <p:pic>
         <p:nvPicPr>
-          <p:cNvPr id="5" name="Resim 4">
+          <p:cNvPr id="5" name="İçerik Yer Tutucusu 4">
             <a:extLst>
               <a:ext uri="{FF2B5EF4-FFF2-40B4-BE49-F238E27FC236}">
-                <a16:creationId xmlns:a16="http://schemas.microsoft.com/office/drawing/2014/main" id="{EC7DB25B-6184-B428-64F6-477CA95D44C8}"/>
+                <a16:creationId xmlns:a16="http://schemas.microsoft.com/office/drawing/2014/main" id="{67D4D572-723B-E72F-81C7-B35C5E0E04F7}"/>
               </a:ext>
             </a:extLst>
           </p:cNvPr>
           <p:cNvPicPr>
-            <a:picLocks noChangeAspect="1"/>
+            <a:picLocks noGrp="1" noChangeAspect="1"/>
           </p:cNvPicPr>
-          <p:nvPr/>
+          <p:nvPr>
+            <p:ph idx="1"/>
+          </p:nvPr>
         </p:nvPicPr>
         <p:blipFill>
           <a:blip r:embed="rId2">
@@ -7695,18 +10380,15 @@
         </p:blipFill>
         <p:spPr>
           <a:xfrm>
-            <a:off x="952500" y="0"/>
-            <a:ext cx="10287000" cy="6858000"/>
-          </a:xfrm>
-          <a:prstGeom prst="rect">
-            <a:avLst/>
-          </a:prstGeom>
+            <a:off x="840979" y="0"/>
+            <a:ext cx="10286999" cy="6858000"/>
+          </a:xfrm>
         </p:spPr>
       </p:pic>
     </p:spTree>
     <p:extLst>
       <p:ext uri="{BB962C8B-B14F-4D97-AF65-F5344CB8AC3E}">
-        <p14:creationId xmlns:p14="http://schemas.microsoft.com/office/powerpoint/2010/main" val="4166325749"/>
+        <p14:creationId xmlns:p14="http://schemas.microsoft.com/office/powerpoint/2010/main" val="1613990799"/>
       </p:ext>
     </p:extLst>
   </p:cSld>

</xml_diff>